<commit_message>
Filling gaps in data and redoing lm and plots for these datapoints
</commit_message>
<xml_diff>
--- a/output/lm road map.pptx
+++ b/output/lm road map.pptx
@@ -11,27 +11,27 @@
     <p:sldId id="259" r:id="rId2"/>
     <p:sldId id="258" r:id="rId3"/>
     <p:sldId id="257" r:id="rId4"/>
-    <p:sldId id="256" r:id="rId5"/>
-    <p:sldId id="260" r:id="rId6"/>
-    <p:sldId id="261" r:id="rId7"/>
-    <p:sldId id="262" r:id="rId8"/>
-    <p:sldId id="263" r:id="rId9"/>
-    <p:sldId id="264" r:id="rId10"/>
-    <p:sldId id="265" r:id="rId11"/>
-    <p:sldId id="266" r:id="rId12"/>
-    <p:sldId id="267" r:id="rId13"/>
-    <p:sldId id="268" r:id="rId14"/>
-    <p:sldId id="269" r:id="rId15"/>
-    <p:sldId id="270" r:id="rId16"/>
-    <p:sldId id="271" r:id="rId17"/>
-    <p:sldId id="272" r:id="rId18"/>
-    <p:sldId id="273" r:id="rId19"/>
-    <p:sldId id="274" r:id="rId20"/>
-    <p:sldId id="275" r:id="rId21"/>
-    <p:sldId id="276" r:id="rId22"/>
-    <p:sldId id="277" r:id="rId23"/>
-    <p:sldId id="278" r:id="rId24"/>
-    <p:sldId id="279" r:id="rId25"/>
+    <p:sldId id="260" r:id="rId5"/>
+    <p:sldId id="261" r:id="rId6"/>
+    <p:sldId id="262" r:id="rId7"/>
+    <p:sldId id="263" r:id="rId8"/>
+    <p:sldId id="264" r:id="rId9"/>
+    <p:sldId id="265" r:id="rId10"/>
+    <p:sldId id="266" r:id="rId11"/>
+    <p:sldId id="267" r:id="rId12"/>
+    <p:sldId id="268" r:id="rId13"/>
+    <p:sldId id="269" r:id="rId14"/>
+    <p:sldId id="270" r:id="rId15"/>
+    <p:sldId id="271" r:id="rId16"/>
+    <p:sldId id="272" r:id="rId17"/>
+    <p:sldId id="273" r:id="rId18"/>
+    <p:sldId id="274" r:id="rId19"/>
+    <p:sldId id="275" r:id="rId20"/>
+    <p:sldId id="276" r:id="rId21"/>
+    <p:sldId id="277" r:id="rId22"/>
+    <p:sldId id="278" r:id="rId23"/>
+    <p:sldId id="279" r:id="rId24"/>
+    <p:sldId id="280" r:id="rId25"/>
   </p:sldIdLst>
   <p:sldSz cx="12192000" cy="6858000"/>
   <p:notesSz cx="6858000" cy="9144000"/>
@@ -3908,7 +3908,7 @@
           <p:cNvPr id="2" name="Title 1">
             <a:extLst>
               <a:ext uri="{FF2B5EF4-FFF2-40B4-BE49-F238E27FC236}">
-                <a16:creationId xmlns:a16="http://schemas.microsoft.com/office/drawing/2014/main" id="{AC2EB40C-754F-2ADE-DECE-5D5F612EFD67}"/>
+                <a16:creationId xmlns:a16="http://schemas.microsoft.com/office/drawing/2014/main" id="{AFDF2E55-FDC6-2AA5-0C49-F5E0012CD08E}"/>
               </a:ext>
             </a:extLst>
           </p:cNvPr>
@@ -3933,7 +3933,7 @@
           <p:cNvPr id="3" name="Content Placeholder 2">
             <a:extLst>
               <a:ext uri="{FF2B5EF4-FFF2-40B4-BE49-F238E27FC236}">
-                <a16:creationId xmlns:a16="http://schemas.microsoft.com/office/drawing/2014/main" id="{CAF30659-9266-77F2-AF59-69D3E418C7B4}"/>
+                <a16:creationId xmlns:a16="http://schemas.microsoft.com/office/drawing/2014/main" id="{DA860A8E-E50C-A289-9A27-A8FF9E304078}"/>
               </a:ext>
             </a:extLst>
           </p:cNvPr>
@@ -3958,7 +3958,7 @@
           <p:cNvPr id="5" name="Picture 4">
             <a:extLst>
               <a:ext uri="{FF2B5EF4-FFF2-40B4-BE49-F238E27FC236}">
-                <a16:creationId xmlns:a16="http://schemas.microsoft.com/office/drawing/2014/main" id="{DF2BE1D6-87DA-4EDB-4EDB-CF5F71BD4FF6}"/>
+                <a16:creationId xmlns:a16="http://schemas.microsoft.com/office/drawing/2014/main" id="{2AF01455-6B73-D26C-A891-A7117B505430}"/>
               </a:ext>
             </a:extLst>
           </p:cNvPr>
@@ -3975,8 +3975,8 @@
         </p:blipFill>
         <p:spPr>
           <a:xfrm>
-            <a:off x="2020249" y="0"/>
-            <a:ext cx="8151501" cy="6858000"/>
+            <a:off x="1969062" y="0"/>
+            <a:ext cx="8253876" cy="6858000"/>
           </a:xfrm>
           <a:prstGeom prst="rect">
             <a:avLst/>
@@ -3986,7 +3986,7 @@
     </p:spTree>
     <p:extLst>
       <p:ext uri="{BB962C8B-B14F-4D97-AF65-F5344CB8AC3E}">
-        <p14:creationId xmlns:p14="http://schemas.microsoft.com/office/powerpoint/2010/main" val="3608250292"/>
+        <p14:creationId xmlns:p14="http://schemas.microsoft.com/office/powerpoint/2010/main" val="426159152"/>
       </p:ext>
     </p:extLst>
   </p:cSld>
@@ -4018,7 +4018,7 @@
           <p:cNvPr id="2" name="Title 1">
             <a:extLst>
               <a:ext uri="{FF2B5EF4-FFF2-40B4-BE49-F238E27FC236}">
-                <a16:creationId xmlns:a16="http://schemas.microsoft.com/office/drawing/2014/main" id="{DAEE9AA1-D0B5-B465-BA9F-606D08691F7B}"/>
+                <a16:creationId xmlns:a16="http://schemas.microsoft.com/office/drawing/2014/main" id="{72CD2E70-E50F-288D-44A2-9CD69A69B622}"/>
               </a:ext>
             </a:extLst>
           </p:cNvPr>
@@ -4043,7 +4043,7 @@
           <p:cNvPr id="3" name="Content Placeholder 2">
             <a:extLst>
               <a:ext uri="{FF2B5EF4-FFF2-40B4-BE49-F238E27FC236}">
-                <a16:creationId xmlns:a16="http://schemas.microsoft.com/office/drawing/2014/main" id="{510555E6-A9FD-28F0-70B6-10E5B86DA318}"/>
+                <a16:creationId xmlns:a16="http://schemas.microsoft.com/office/drawing/2014/main" id="{E85CDD0E-270A-F1A4-FB26-CD77E25167C1}"/>
               </a:ext>
             </a:extLst>
           </p:cNvPr>
@@ -4068,7 +4068,7 @@
           <p:cNvPr id="5" name="Picture 4">
             <a:extLst>
               <a:ext uri="{FF2B5EF4-FFF2-40B4-BE49-F238E27FC236}">
-                <a16:creationId xmlns:a16="http://schemas.microsoft.com/office/drawing/2014/main" id="{40A2CF43-76E7-C18D-E638-1DCAA2994A86}"/>
+                <a16:creationId xmlns:a16="http://schemas.microsoft.com/office/drawing/2014/main" id="{0EFDCF6F-565E-C0D6-001D-AFDC2A5DF8DB}"/>
               </a:ext>
             </a:extLst>
           </p:cNvPr>
@@ -4096,7 +4096,7 @@
     </p:spTree>
     <p:extLst>
       <p:ext uri="{BB962C8B-B14F-4D97-AF65-F5344CB8AC3E}">
-        <p14:creationId xmlns:p14="http://schemas.microsoft.com/office/powerpoint/2010/main" val="2501330180"/>
+        <p14:creationId xmlns:p14="http://schemas.microsoft.com/office/powerpoint/2010/main" val="3361318608"/>
       </p:ext>
     </p:extLst>
   </p:cSld>
@@ -4128,7 +4128,7 @@
           <p:cNvPr id="2" name="Title 1">
             <a:extLst>
               <a:ext uri="{FF2B5EF4-FFF2-40B4-BE49-F238E27FC236}">
-                <a16:creationId xmlns:a16="http://schemas.microsoft.com/office/drawing/2014/main" id="{65B0F0A0-B96A-9481-FD34-216584CC94C7}"/>
+                <a16:creationId xmlns:a16="http://schemas.microsoft.com/office/drawing/2014/main" id="{DC448DEB-4EC9-9590-DCB5-87B977CDFA43}"/>
               </a:ext>
             </a:extLst>
           </p:cNvPr>
@@ -4153,7 +4153,7 @@
           <p:cNvPr id="3" name="Content Placeholder 2">
             <a:extLst>
               <a:ext uri="{FF2B5EF4-FFF2-40B4-BE49-F238E27FC236}">
-                <a16:creationId xmlns:a16="http://schemas.microsoft.com/office/drawing/2014/main" id="{C1A3D754-A49E-2721-6C71-465AE0111609}"/>
+                <a16:creationId xmlns:a16="http://schemas.microsoft.com/office/drawing/2014/main" id="{E6075704-6347-5A2A-9185-6EA9DC7D010C}"/>
               </a:ext>
             </a:extLst>
           </p:cNvPr>
@@ -4178,7 +4178,7 @@
           <p:cNvPr id="5" name="Picture 4">
             <a:extLst>
               <a:ext uri="{FF2B5EF4-FFF2-40B4-BE49-F238E27FC236}">
-                <a16:creationId xmlns:a16="http://schemas.microsoft.com/office/drawing/2014/main" id="{A26468F9-2591-DC2D-7B14-D75BCB8F8176}"/>
+                <a16:creationId xmlns:a16="http://schemas.microsoft.com/office/drawing/2014/main" id="{6CBEADF2-DC54-599C-CD21-8A1FF69F7C15}"/>
               </a:ext>
             </a:extLst>
           </p:cNvPr>
@@ -4195,8 +4195,8 @@
         </p:blipFill>
         <p:spPr>
           <a:xfrm>
-            <a:off x="2088078" y="0"/>
-            <a:ext cx="8015844" cy="6858000"/>
+            <a:off x="2090178" y="9047"/>
+            <a:ext cx="8011643" cy="6839905"/>
           </a:xfrm>
           <a:prstGeom prst="rect">
             <a:avLst/>
@@ -4206,7 +4206,7 @@
     </p:spTree>
     <p:extLst>
       <p:ext uri="{BB962C8B-B14F-4D97-AF65-F5344CB8AC3E}">
-        <p14:creationId xmlns:p14="http://schemas.microsoft.com/office/powerpoint/2010/main" val="2260842004"/>
+        <p14:creationId xmlns:p14="http://schemas.microsoft.com/office/powerpoint/2010/main" val="4250149094"/>
       </p:ext>
     </p:extLst>
   </p:cSld>
@@ -4238,7 +4238,7 @@
           <p:cNvPr id="2" name="Title 1">
             <a:extLst>
               <a:ext uri="{FF2B5EF4-FFF2-40B4-BE49-F238E27FC236}">
-                <a16:creationId xmlns:a16="http://schemas.microsoft.com/office/drawing/2014/main" id="{23BA124E-E590-6F43-70BC-320AE194ADB2}"/>
+                <a16:creationId xmlns:a16="http://schemas.microsoft.com/office/drawing/2014/main" id="{88A5E03C-71BB-2157-6EED-BFC57439BCE9}"/>
               </a:ext>
             </a:extLst>
           </p:cNvPr>
@@ -4263,7 +4263,7 @@
           <p:cNvPr id="3" name="Content Placeholder 2">
             <a:extLst>
               <a:ext uri="{FF2B5EF4-FFF2-40B4-BE49-F238E27FC236}">
-                <a16:creationId xmlns:a16="http://schemas.microsoft.com/office/drawing/2014/main" id="{19C2BE88-8409-A7B2-727F-E677A547D675}"/>
+                <a16:creationId xmlns:a16="http://schemas.microsoft.com/office/drawing/2014/main" id="{E5F6346C-98BF-6F4B-2F42-30577810FDE3}"/>
               </a:ext>
             </a:extLst>
           </p:cNvPr>
@@ -4288,7 +4288,7 @@
           <p:cNvPr id="5" name="Picture 4">
             <a:extLst>
               <a:ext uri="{FF2B5EF4-FFF2-40B4-BE49-F238E27FC236}">
-                <a16:creationId xmlns:a16="http://schemas.microsoft.com/office/drawing/2014/main" id="{EEBB8F25-2BE8-45B8-9D11-4381C0B3442A}"/>
+                <a16:creationId xmlns:a16="http://schemas.microsoft.com/office/drawing/2014/main" id="{1D871F13-7156-CA11-0717-0365F82C96CB}"/>
               </a:ext>
             </a:extLst>
           </p:cNvPr>
@@ -4316,7 +4316,7 @@
     </p:spTree>
     <p:extLst>
       <p:ext uri="{BB962C8B-B14F-4D97-AF65-F5344CB8AC3E}">
-        <p14:creationId xmlns:p14="http://schemas.microsoft.com/office/powerpoint/2010/main" val="3542838794"/>
+        <p14:creationId xmlns:p14="http://schemas.microsoft.com/office/powerpoint/2010/main" val="93268739"/>
       </p:ext>
     </p:extLst>
   </p:cSld>
@@ -4348,7 +4348,7 @@
           <p:cNvPr id="2" name="Title 1">
             <a:extLst>
               <a:ext uri="{FF2B5EF4-FFF2-40B4-BE49-F238E27FC236}">
-                <a16:creationId xmlns:a16="http://schemas.microsoft.com/office/drawing/2014/main" id="{0FDC915A-3D9E-ECE9-7F4B-DE688B11FAEA}"/>
+                <a16:creationId xmlns:a16="http://schemas.microsoft.com/office/drawing/2014/main" id="{57874461-122F-A4F6-09BA-5A0EBBD59617}"/>
               </a:ext>
             </a:extLst>
           </p:cNvPr>
@@ -4373,7 +4373,7 @@
           <p:cNvPr id="3" name="Content Placeholder 2">
             <a:extLst>
               <a:ext uri="{FF2B5EF4-FFF2-40B4-BE49-F238E27FC236}">
-                <a16:creationId xmlns:a16="http://schemas.microsoft.com/office/drawing/2014/main" id="{D659ABF7-CECA-BBF6-7ED1-71B7D8557893}"/>
+                <a16:creationId xmlns:a16="http://schemas.microsoft.com/office/drawing/2014/main" id="{4063224C-DB12-642F-40BC-2F2AC5BE5F73}"/>
               </a:ext>
             </a:extLst>
           </p:cNvPr>
@@ -4398,7 +4398,7 @@
           <p:cNvPr id="5" name="Picture 4">
             <a:extLst>
               <a:ext uri="{FF2B5EF4-FFF2-40B4-BE49-F238E27FC236}">
-                <a16:creationId xmlns:a16="http://schemas.microsoft.com/office/drawing/2014/main" id="{7B7893EF-02C9-ECF5-FF00-D535746EF115}"/>
+                <a16:creationId xmlns:a16="http://schemas.microsoft.com/office/drawing/2014/main" id="{C72D0BE4-D238-4D07-7A65-F822A96376B7}"/>
               </a:ext>
             </a:extLst>
           </p:cNvPr>
@@ -4415,8 +4415,8 @@
         </p:blipFill>
         <p:spPr>
           <a:xfrm>
-            <a:off x="1636589" y="0"/>
-            <a:ext cx="8918821" cy="6858000"/>
+            <a:off x="2044821" y="0"/>
+            <a:ext cx="8102358" cy="6858000"/>
           </a:xfrm>
           <a:prstGeom prst="rect">
             <a:avLst/>
@@ -4426,7 +4426,7 @@
     </p:spTree>
     <p:extLst>
       <p:ext uri="{BB962C8B-B14F-4D97-AF65-F5344CB8AC3E}">
-        <p14:creationId xmlns:p14="http://schemas.microsoft.com/office/powerpoint/2010/main" val="4222402276"/>
+        <p14:creationId xmlns:p14="http://schemas.microsoft.com/office/powerpoint/2010/main" val="790388713"/>
       </p:ext>
     </p:extLst>
   </p:cSld>
@@ -4458,7 +4458,7 @@
           <p:cNvPr id="2" name="Title 1">
             <a:extLst>
               <a:ext uri="{FF2B5EF4-FFF2-40B4-BE49-F238E27FC236}">
-                <a16:creationId xmlns:a16="http://schemas.microsoft.com/office/drawing/2014/main" id="{FD65BAEC-ED58-46E5-813F-F6BE1BD2C556}"/>
+                <a16:creationId xmlns:a16="http://schemas.microsoft.com/office/drawing/2014/main" id="{DD830A76-39B8-5671-7B92-07B2B05A03EA}"/>
               </a:ext>
             </a:extLst>
           </p:cNvPr>
@@ -4483,7 +4483,7 @@
           <p:cNvPr id="3" name="Content Placeholder 2">
             <a:extLst>
               <a:ext uri="{FF2B5EF4-FFF2-40B4-BE49-F238E27FC236}">
-                <a16:creationId xmlns:a16="http://schemas.microsoft.com/office/drawing/2014/main" id="{0383FA53-1C36-A013-31A1-D5D60DB4BBC3}"/>
+                <a16:creationId xmlns:a16="http://schemas.microsoft.com/office/drawing/2014/main" id="{E00505A4-AACC-EEB1-3E30-56B49F9205EC}"/>
               </a:ext>
             </a:extLst>
           </p:cNvPr>
@@ -4508,7 +4508,7 @@
           <p:cNvPr id="5" name="Picture 4">
             <a:extLst>
               <a:ext uri="{FF2B5EF4-FFF2-40B4-BE49-F238E27FC236}">
-                <a16:creationId xmlns:a16="http://schemas.microsoft.com/office/drawing/2014/main" id="{40C1F9E4-54F8-4FCC-014B-5F4F3CA37338}"/>
+                <a16:creationId xmlns:a16="http://schemas.microsoft.com/office/drawing/2014/main" id="{5DAD883D-53A1-5153-ADEE-903C819DE059}"/>
               </a:ext>
             </a:extLst>
           </p:cNvPr>
@@ -4536,7 +4536,7 @@
     </p:spTree>
     <p:extLst>
       <p:ext uri="{BB962C8B-B14F-4D97-AF65-F5344CB8AC3E}">
-        <p14:creationId xmlns:p14="http://schemas.microsoft.com/office/powerpoint/2010/main" val="3211858846"/>
+        <p14:creationId xmlns:p14="http://schemas.microsoft.com/office/powerpoint/2010/main" val="2821754941"/>
       </p:ext>
     </p:extLst>
   </p:cSld>
@@ -4568,7 +4568,7 @@
           <p:cNvPr id="2" name="Title 1">
             <a:extLst>
               <a:ext uri="{FF2B5EF4-FFF2-40B4-BE49-F238E27FC236}">
-                <a16:creationId xmlns:a16="http://schemas.microsoft.com/office/drawing/2014/main" id="{A6DF7542-8D7F-FF71-3F95-AF89E1F5A355}"/>
+                <a16:creationId xmlns:a16="http://schemas.microsoft.com/office/drawing/2014/main" id="{F4DE864C-6075-1B7E-64B9-CB43D17694C7}"/>
               </a:ext>
             </a:extLst>
           </p:cNvPr>
@@ -4593,7 +4593,7 @@
           <p:cNvPr id="3" name="Content Placeholder 2">
             <a:extLst>
               <a:ext uri="{FF2B5EF4-FFF2-40B4-BE49-F238E27FC236}">
-                <a16:creationId xmlns:a16="http://schemas.microsoft.com/office/drawing/2014/main" id="{646C2084-18D2-26B3-5C5A-0F25DA57FE82}"/>
+                <a16:creationId xmlns:a16="http://schemas.microsoft.com/office/drawing/2014/main" id="{5D62A96A-C7E4-3061-7199-04587D9BE126}"/>
               </a:ext>
             </a:extLst>
           </p:cNvPr>
@@ -4618,7 +4618,7 @@
           <p:cNvPr id="5" name="Picture 4">
             <a:extLst>
               <a:ext uri="{FF2B5EF4-FFF2-40B4-BE49-F238E27FC236}">
-                <a16:creationId xmlns:a16="http://schemas.microsoft.com/office/drawing/2014/main" id="{67FE637B-B107-080A-E779-22A650EFA3C0}"/>
+                <a16:creationId xmlns:a16="http://schemas.microsoft.com/office/drawing/2014/main" id="{567CA87C-6C04-8E24-68C5-AE13451DE73B}"/>
               </a:ext>
             </a:extLst>
           </p:cNvPr>
@@ -4635,8 +4635,8 @@
         </p:blipFill>
         <p:spPr>
           <a:xfrm>
-            <a:off x="1533616" y="0"/>
-            <a:ext cx="9124767" cy="6858000"/>
+            <a:off x="1866132" y="0"/>
+            <a:ext cx="8459735" cy="6858000"/>
           </a:xfrm>
           <a:prstGeom prst="rect">
             <a:avLst/>
@@ -4646,7 +4646,7 @@
     </p:spTree>
     <p:extLst>
       <p:ext uri="{BB962C8B-B14F-4D97-AF65-F5344CB8AC3E}">
-        <p14:creationId xmlns:p14="http://schemas.microsoft.com/office/powerpoint/2010/main" val="2826093484"/>
+        <p14:creationId xmlns:p14="http://schemas.microsoft.com/office/powerpoint/2010/main" val="3519385191"/>
       </p:ext>
     </p:extLst>
   </p:cSld>
@@ -4678,7 +4678,7 @@
           <p:cNvPr id="2" name="Title 1">
             <a:extLst>
               <a:ext uri="{FF2B5EF4-FFF2-40B4-BE49-F238E27FC236}">
-                <a16:creationId xmlns:a16="http://schemas.microsoft.com/office/drawing/2014/main" id="{2BDFFE39-33FA-CF20-8028-F0A95821B493}"/>
+                <a16:creationId xmlns:a16="http://schemas.microsoft.com/office/drawing/2014/main" id="{B05A5D72-C9D4-E6D4-3ABA-DBD18DC5E3FD}"/>
               </a:ext>
             </a:extLst>
           </p:cNvPr>
@@ -4703,7 +4703,7 @@
           <p:cNvPr id="3" name="Content Placeholder 2">
             <a:extLst>
               <a:ext uri="{FF2B5EF4-FFF2-40B4-BE49-F238E27FC236}">
-                <a16:creationId xmlns:a16="http://schemas.microsoft.com/office/drawing/2014/main" id="{B195332C-6454-E3F7-B031-DFDE8E025E12}"/>
+                <a16:creationId xmlns:a16="http://schemas.microsoft.com/office/drawing/2014/main" id="{7CDD8643-1FF3-C268-93B7-AF3A12B759AB}"/>
               </a:ext>
             </a:extLst>
           </p:cNvPr>
@@ -4728,7 +4728,7 @@
           <p:cNvPr id="5" name="Picture 4">
             <a:extLst>
               <a:ext uri="{FF2B5EF4-FFF2-40B4-BE49-F238E27FC236}">
-                <a16:creationId xmlns:a16="http://schemas.microsoft.com/office/drawing/2014/main" id="{9171A489-1C2E-6858-CFD3-011A835F0E60}"/>
+                <a16:creationId xmlns:a16="http://schemas.microsoft.com/office/drawing/2014/main" id="{C81D7299-CFB1-84CF-9CA5-7555C8B49036}"/>
               </a:ext>
             </a:extLst>
           </p:cNvPr>
@@ -4756,7 +4756,7 @@
     </p:spTree>
     <p:extLst>
       <p:ext uri="{BB962C8B-B14F-4D97-AF65-F5344CB8AC3E}">
-        <p14:creationId xmlns:p14="http://schemas.microsoft.com/office/powerpoint/2010/main" val="159620452"/>
+        <p14:creationId xmlns:p14="http://schemas.microsoft.com/office/powerpoint/2010/main" val="2459341569"/>
       </p:ext>
     </p:extLst>
   </p:cSld>
@@ -4788,7 +4788,7 @@
           <p:cNvPr id="2" name="Title 1">
             <a:extLst>
               <a:ext uri="{FF2B5EF4-FFF2-40B4-BE49-F238E27FC236}">
-                <a16:creationId xmlns:a16="http://schemas.microsoft.com/office/drawing/2014/main" id="{9DC19853-CC37-67F8-910A-4308F57556A8}"/>
+                <a16:creationId xmlns:a16="http://schemas.microsoft.com/office/drawing/2014/main" id="{661CC5E1-D467-C695-CB3A-DBBDCEB296D4}"/>
               </a:ext>
             </a:extLst>
           </p:cNvPr>
@@ -4813,7 +4813,7 @@
           <p:cNvPr id="3" name="Content Placeholder 2">
             <a:extLst>
               <a:ext uri="{FF2B5EF4-FFF2-40B4-BE49-F238E27FC236}">
-                <a16:creationId xmlns:a16="http://schemas.microsoft.com/office/drawing/2014/main" id="{C90546D1-E062-2A7A-6FAA-B99F428F5D08}"/>
+                <a16:creationId xmlns:a16="http://schemas.microsoft.com/office/drawing/2014/main" id="{9093FD01-0C50-894C-72CB-0FB2583C9F23}"/>
               </a:ext>
             </a:extLst>
           </p:cNvPr>
@@ -4829,7 +4829,7 @@
           <a:bodyPr/>
           <a:lstStyle/>
           <a:p>
-            <a:endParaRPr lang="en-GB"/>
+            <a:endParaRPr lang="en-GB" dirty="0"/>
           </a:p>
         </p:txBody>
       </p:sp>
@@ -4838,7 +4838,7 @@
           <p:cNvPr id="5" name="Picture 4">
             <a:extLst>
               <a:ext uri="{FF2B5EF4-FFF2-40B4-BE49-F238E27FC236}">
-                <a16:creationId xmlns:a16="http://schemas.microsoft.com/office/drawing/2014/main" id="{2B19053D-0ED3-4936-C3EA-D8CEBF8D0BC4}"/>
+                <a16:creationId xmlns:a16="http://schemas.microsoft.com/office/drawing/2014/main" id="{BFE51EDC-2900-63A7-2565-CA1FA3C5952C}"/>
               </a:ext>
             </a:extLst>
           </p:cNvPr>
@@ -4855,8 +4855,8 @@
         </p:blipFill>
         <p:spPr>
           <a:xfrm>
-            <a:off x="1909141" y="0"/>
-            <a:ext cx="8373717" cy="6858000"/>
+            <a:off x="2247657" y="0"/>
+            <a:ext cx="7696685" cy="6858000"/>
           </a:xfrm>
           <a:prstGeom prst="rect">
             <a:avLst/>
@@ -4866,7 +4866,7 @@
     </p:spTree>
     <p:extLst>
       <p:ext uri="{BB962C8B-B14F-4D97-AF65-F5344CB8AC3E}">
-        <p14:creationId xmlns:p14="http://schemas.microsoft.com/office/powerpoint/2010/main" val="3293297342"/>
+        <p14:creationId xmlns:p14="http://schemas.microsoft.com/office/powerpoint/2010/main" val="777936597"/>
       </p:ext>
     </p:extLst>
   </p:cSld>
@@ -4898,7 +4898,7 @@
           <p:cNvPr id="2" name="Title 1">
             <a:extLst>
               <a:ext uri="{FF2B5EF4-FFF2-40B4-BE49-F238E27FC236}">
-                <a16:creationId xmlns:a16="http://schemas.microsoft.com/office/drawing/2014/main" id="{8D1BDB75-EC48-3F48-AED8-A6BF5A5999ED}"/>
+                <a16:creationId xmlns:a16="http://schemas.microsoft.com/office/drawing/2014/main" id="{0F55E49B-0CB1-122C-967B-F05F6BD0C961}"/>
               </a:ext>
             </a:extLst>
           </p:cNvPr>
@@ -4923,7 +4923,7 @@
           <p:cNvPr id="3" name="Content Placeholder 2">
             <a:extLst>
               <a:ext uri="{FF2B5EF4-FFF2-40B4-BE49-F238E27FC236}">
-                <a16:creationId xmlns:a16="http://schemas.microsoft.com/office/drawing/2014/main" id="{25A5B95D-E1F9-E9E3-E514-F66955D335AD}"/>
+                <a16:creationId xmlns:a16="http://schemas.microsoft.com/office/drawing/2014/main" id="{8D6976DC-72B5-B26B-FAFD-54CD770399A2}"/>
               </a:ext>
             </a:extLst>
           </p:cNvPr>
@@ -4948,7 +4948,7 @@
           <p:cNvPr id="5" name="Picture 4">
             <a:extLst>
               <a:ext uri="{FF2B5EF4-FFF2-40B4-BE49-F238E27FC236}">
-                <a16:creationId xmlns:a16="http://schemas.microsoft.com/office/drawing/2014/main" id="{E4A297F9-7A22-7796-E8D8-751E0CE4F15B}"/>
+                <a16:creationId xmlns:a16="http://schemas.microsoft.com/office/drawing/2014/main" id="{5E805922-5D9A-FC97-0219-A655964315A4}"/>
               </a:ext>
             </a:extLst>
           </p:cNvPr>
@@ -4976,7 +4976,7 @@
     </p:spTree>
     <p:extLst>
       <p:ext uri="{BB962C8B-B14F-4D97-AF65-F5344CB8AC3E}">
-        <p14:creationId xmlns:p14="http://schemas.microsoft.com/office/powerpoint/2010/main" val="1038245219"/>
+        <p14:creationId xmlns:p14="http://schemas.microsoft.com/office/powerpoint/2010/main" val="4243692493"/>
       </p:ext>
     </p:extLst>
   </p:cSld>
@@ -8212,7 +8212,7 @@
           <p:cNvPr id="2" name="Title 1">
             <a:extLst>
               <a:ext uri="{FF2B5EF4-FFF2-40B4-BE49-F238E27FC236}">
-                <a16:creationId xmlns:a16="http://schemas.microsoft.com/office/drawing/2014/main" id="{F05B169A-2B69-7AA6-A332-0A56E197D1FC}"/>
+                <a16:creationId xmlns:a16="http://schemas.microsoft.com/office/drawing/2014/main" id="{476ECAD7-B362-DF09-361A-EEE66A2B3141}"/>
               </a:ext>
             </a:extLst>
           </p:cNvPr>
@@ -8237,7 +8237,7 @@
           <p:cNvPr id="3" name="Content Placeholder 2">
             <a:extLst>
               <a:ext uri="{FF2B5EF4-FFF2-40B4-BE49-F238E27FC236}">
-                <a16:creationId xmlns:a16="http://schemas.microsoft.com/office/drawing/2014/main" id="{4912AE93-F877-4434-46F7-392BC0C094FE}"/>
+                <a16:creationId xmlns:a16="http://schemas.microsoft.com/office/drawing/2014/main" id="{B58154A3-EDF9-FA48-84F5-5F64B0A8D8C4}"/>
               </a:ext>
             </a:extLst>
           </p:cNvPr>
@@ -8262,7 +8262,7 @@
           <p:cNvPr id="5" name="Picture 4">
             <a:extLst>
               <a:ext uri="{FF2B5EF4-FFF2-40B4-BE49-F238E27FC236}">
-                <a16:creationId xmlns:a16="http://schemas.microsoft.com/office/drawing/2014/main" id="{FF4AA6A9-7FE0-6ED7-749F-DEF7CF478B2D}"/>
+                <a16:creationId xmlns:a16="http://schemas.microsoft.com/office/drawing/2014/main" id="{183403AA-2C42-65FC-C9DF-F250DE84D7AB}"/>
               </a:ext>
             </a:extLst>
           </p:cNvPr>
@@ -8279,8 +8279,8 @@
         </p:blipFill>
         <p:spPr>
           <a:xfrm>
-            <a:off x="2004532" y="0"/>
-            <a:ext cx="8182936" cy="6858000"/>
+            <a:off x="2562960" y="0"/>
+            <a:ext cx="7066080" cy="6858000"/>
           </a:xfrm>
           <a:prstGeom prst="rect">
             <a:avLst/>
@@ -8290,7 +8290,7 @@
     </p:spTree>
     <p:extLst>
       <p:ext uri="{BB962C8B-B14F-4D97-AF65-F5344CB8AC3E}">
-        <p14:creationId xmlns:p14="http://schemas.microsoft.com/office/powerpoint/2010/main" val="3316667012"/>
+        <p14:creationId xmlns:p14="http://schemas.microsoft.com/office/powerpoint/2010/main" val="2112597275"/>
       </p:ext>
     </p:extLst>
   </p:cSld>
@@ -8322,7 +8322,7 @@
           <p:cNvPr id="2" name="Title 1">
             <a:extLst>
               <a:ext uri="{FF2B5EF4-FFF2-40B4-BE49-F238E27FC236}">
-                <a16:creationId xmlns:a16="http://schemas.microsoft.com/office/drawing/2014/main" id="{15DC1895-26B2-F05D-F7B6-311B9CE5F63C}"/>
+                <a16:creationId xmlns:a16="http://schemas.microsoft.com/office/drawing/2014/main" id="{DC360FD6-F441-8BBE-BCF6-11C93AE6391A}"/>
               </a:ext>
             </a:extLst>
           </p:cNvPr>
@@ -8347,7 +8347,7 @@
           <p:cNvPr id="3" name="Content Placeholder 2">
             <a:extLst>
               <a:ext uri="{FF2B5EF4-FFF2-40B4-BE49-F238E27FC236}">
-                <a16:creationId xmlns:a16="http://schemas.microsoft.com/office/drawing/2014/main" id="{05B4D63C-F46F-9E12-3B8C-7AA9707E97B2}"/>
+                <a16:creationId xmlns:a16="http://schemas.microsoft.com/office/drawing/2014/main" id="{AB8F23B6-7EDC-3B66-D6F8-28516C54E4BB}"/>
               </a:ext>
             </a:extLst>
           </p:cNvPr>
@@ -8372,7 +8372,7 @@
           <p:cNvPr id="5" name="Picture 4">
             <a:extLst>
               <a:ext uri="{FF2B5EF4-FFF2-40B4-BE49-F238E27FC236}">
-                <a16:creationId xmlns:a16="http://schemas.microsoft.com/office/drawing/2014/main" id="{EDF204EA-D01B-D0BF-AA1E-B8BC1DB293BA}"/>
+                <a16:creationId xmlns:a16="http://schemas.microsoft.com/office/drawing/2014/main" id="{49025565-63CD-57C0-2724-A49EE1B7909B}"/>
               </a:ext>
             </a:extLst>
           </p:cNvPr>
@@ -8400,7 +8400,7 @@
     </p:spTree>
     <p:extLst>
       <p:ext uri="{BB962C8B-B14F-4D97-AF65-F5344CB8AC3E}">
-        <p14:creationId xmlns:p14="http://schemas.microsoft.com/office/powerpoint/2010/main" val="2289864747"/>
+        <p14:creationId xmlns:p14="http://schemas.microsoft.com/office/powerpoint/2010/main" val="1360178508"/>
       </p:ext>
     </p:extLst>
   </p:cSld>
@@ -8432,7 +8432,7 @@
           <p:cNvPr id="2" name="Title 1">
             <a:extLst>
               <a:ext uri="{FF2B5EF4-FFF2-40B4-BE49-F238E27FC236}">
-                <a16:creationId xmlns:a16="http://schemas.microsoft.com/office/drawing/2014/main" id="{D2183F0A-BEF7-4D8B-4E98-9DAB8B391FEC}"/>
+                <a16:creationId xmlns:a16="http://schemas.microsoft.com/office/drawing/2014/main" id="{87537DDD-7DB4-B98B-7A9B-2A1A7493F9D9}"/>
               </a:ext>
             </a:extLst>
           </p:cNvPr>
@@ -8457,7 +8457,7 @@
           <p:cNvPr id="3" name="Content Placeholder 2">
             <a:extLst>
               <a:ext uri="{FF2B5EF4-FFF2-40B4-BE49-F238E27FC236}">
-                <a16:creationId xmlns:a16="http://schemas.microsoft.com/office/drawing/2014/main" id="{0DA253E6-2CE6-C64B-1CE0-F5D3929C127F}"/>
+                <a16:creationId xmlns:a16="http://schemas.microsoft.com/office/drawing/2014/main" id="{ECD38B7E-1D23-E10B-1B08-0CBB7EA624E1}"/>
               </a:ext>
             </a:extLst>
           </p:cNvPr>
@@ -8479,10 +8479,10 @@
       </p:sp>
       <p:pic>
         <p:nvPicPr>
-          <p:cNvPr id="7" name="Picture 6">
+          <p:cNvPr id="5" name="Picture 4">
             <a:extLst>
               <a:ext uri="{FF2B5EF4-FFF2-40B4-BE49-F238E27FC236}">
-                <a16:creationId xmlns:a16="http://schemas.microsoft.com/office/drawing/2014/main" id="{E8DE997A-1B79-0128-203B-73F52366A348}"/>
+                <a16:creationId xmlns:a16="http://schemas.microsoft.com/office/drawing/2014/main" id="{79A67FC0-0658-44FB-CA71-990AD68C3CD9}"/>
               </a:ext>
             </a:extLst>
           </p:cNvPr>
@@ -8499,8 +8499,8 @@
         </p:blipFill>
         <p:spPr>
           <a:xfrm>
-            <a:off x="2094126" y="0"/>
-            <a:ext cx="8003748" cy="6858000"/>
+            <a:off x="2560244" y="0"/>
+            <a:ext cx="7071512" cy="6858000"/>
           </a:xfrm>
           <a:prstGeom prst="rect">
             <a:avLst/>
@@ -8510,7 +8510,7 @@
     </p:spTree>
     <p:extLst>
       <p:ext uri="{BB962C8B-B14F-4D97-AF65-F5344CB8AC3E}">
-        <p14:creationId xmlns:p14="http://schemas.microsoft.com/office/powerpoint/2010/main" val="3214852107"/>
+        <p14:creationId xmlns:p14="http://schemas.microsoft.com/office/powerpoint/2010/main" val="3155592535"/>
       </p:ext>
     </p:extLst>
   </p:cSld>
@@ -8542,7 +8542,7 @@
           <p:cNvPr id="2" name="Title 1">
             <a:extLst>
               <a:ext uri="{FF2B5EF4-FFF2-40B4-BE49-F238E27FC236}">
-                <a16:creationId xmlns:a16="http://schemas.microsoft.com/office/drawing/2014/main" id="{307C2E6D-1EAC-123B-BF28-D6D88ECE31F9}"/>
+                <a16:creationId xmlns:a16="http://schemas.microsoft.com/office/drawing/2014/main" id="{FBE8671B-C101-6D78-9860-012C9C377DCA}"/>
               </a:ext>
             </a:extLst>
           </p:cNvPr>
@@ -8567,7 +8567,7 @@
           <p:cNvPr id="3" name="Content Placeholder 2">
             <a:extLst>
               <a:ext uri="{FF2B5EF4-FFF2-40B4-BE49-F238E27FC236}">
-                <a16:creationId xmlns:a16="http://schemas.microsoft.com/office/drawing/2014/main" id="{73D8A3FB-5089-DE70-6E59-DAA60FA7F20A}"/>
+                <a16:creationId xmlns:a16="http://schemas.microsoft.com/office/drawing/2014/main" id="{6732B8D9-C7C0-AA32-876F-1A2DE8F46CAD}"/>
               </a:ext>
             </a:extLst>
           </p:cNvPr>
@@ -8583,16 +8583,16 @@
           <a:bodyPr/>
           <a:lstStyle/>
           <a:p>
-            <a:endParaRPr lang="en-GB" dirty="0"/>
+            <a:endParaRPr lang="en-GB"/>
           </a:p>
         </p:txBody>
       </p:sp>
       <p:pic>
         <p:nvPicPr>
-          <p:cNvPr id="7" name="Picture 6">
+          <p:cNvPr id="5" name="Picture 4">
             <a:extLst>
               <a:ext uri="{FF2B5EF4-FFF2-40B4-BE49-F238E27FC236}">
-                <a16:creationId xmlns:a16="http://schemas.microsoft.com/office/drawing/2014/main" id="{CB3E911B-D705-A07F-AC1A-16E1D0088323}"/>
+                <a16:creationId xmlns:a16="http://schemas.microsoft.com/office/drawing/2014/main" id="{5D99EF94-BB1F-47B4-8B89-FAF4AAA25C33}"/>
               </a:ext>
             </a:extLst>
           </p:cNvPr>
@@ -8620,7 +8620,7 @@
     </p:spTree>
     <p:extLst>
       <p:ext uri="{BB962C8B-B14F-4D97-AF65-F5344CB8AC3E}">
-        <p14:creationId xmlns:p14="http://schemas.microsoft.com/office/powerpoint/2010/main" val="2844418877"/>
+        <p14:creationId xmlns:p14="http://schemas.microsoft.com/office/powerpoint/2010/main" val="959766954"/>
       </p:ext>
     </p:extLst>
   </p:cSld>
@@ -8652,7 +8652,7 @@
           <p:cNvPr id="2" name="Title 1">
             <a:extLst>
               <a:ext uri="{FF2B5EF4-FFF2-40B4-BE49-F238E27FC236}">
-                <a16:creationId xmlns:a16="http://schemas.microsoft.com/office/drawing/2014/main" id="{C77988B4-8951-9869-0BF5-348894DC3206}"/>
+                <a16:creationId xmlns:a16="http://schemas.microsoft.com/office/drawing/2014/main" id="{E25AECBE-45C1-BF17-52F6-31FAB1657593}"/>
               </a:ext>
             </a:extLst>
           </p:cNvPr>
@@ -8677,7 +8677,7 @@
           <p:cNvPr id="3" name="Content Placeholder 2">
             <a:extLst>
               <a:ext uri="{FF2B5EF4-FFF2-40B4-BE49-F238E27FC236}">
-                <a16:creationId xmlns:a16="http://schemas.microsoft.com/office/drawing/2014/main" id="{8BDE997E-1ED8-3874-74A6-8F45C35519C2}"/>
+                <a16:creationId xmlns:a16="http://schemas.microsoft.com/office/drawing/2014/main" id="{805B68AD-1036-971E-0B90-452D8EC0718A}"/>
               </a:ext>
             </a:extLst>
           </p:cNvPr>
@@ -8702,7 +8702,7 @@
           <p:cNvPr id="5" name="Picture 4">
             <a:extLst>
               <a:ext uri="{FF2B5EF4-FFF2-40B4-BE49-F238E27FC236}">
-                <a16:creationId xmlns:a16="http://schemas.microsoft.com/office/drawing/2014/main" id="{1CA78584-F347-650F-062D-4AC63B546870}"/>
+                <a16:creationId xmlns:a16="http://schemas.microsoft.com/office/drawing/2014/main" id="{4FF4AEA9-EE98-B96C-4302-8070A8B55FE0}"/>
               </a:ext>
             </a:extLst>
           </p:cNvPr>
@@ -8719,8 +8719,8 @@
         </p:blipFill>
         <p:spPr>
           <a:xfrm>
-            <a:off x="2876100" y="2109603"/>
-            <a:ext cx="6439799" cy="2638793"/>
+            <a:off x="3542943" y="2338235"/>
+            <a:ext cx="5106113" cy="2181529"/>
           </a:xfrm>
           <a:prstGeom prst="rect">
             <a:avLst/>
@@ -8730,7 +8730,7 @@
     </p:spTree>
     <p:extLst>
       <p:ext uri="{BB962C8B-B14F-4D97-AF65-F5344CB8AC3E}">
-        <p14:creationId xmlns:p14="http://schemas.microsoft.com/office/powerpoint/2010/main" val="1389432200"/>
+        <p14:creationId xmlns:p14="http://schemas.microsoft.com/office/powerpoint/2010/main" val="887040412"/>
       </p:ext>
     </p:extLst>
   </p:cSld>
@@ -8773,14 +8773,14 @@
             <p:ph idx="1"/>
             <p:extLst>
               <p:ext uri="{D42A27DB-BD31-4B8C-83A1-F6EECF244321}">
-                <p14:modId xmlns:p14="http://schemas.microsoft.com/office/powerpoint/2010/main" val="3519745719"/>
+                <p14:modId xmlns:p14="http://schemas.microsoft.com/office/powerpoint/2010/main" val="1165491587"/>
               </p:ext>
             </p:extLst>
           </p:nvPr>
         </p:nvGraphicFramePr>
         <p:xfrm>
           <a:off x="218768" y="134476"/>
-          <a:ext cx="11737258" cy="5484876"/>
+          <a:ext cx="11737258" cy="6540952"/>
         </p:xfrm>
         <a:graphic>
           <a:graphicData uri="http://schemas.openxmlformats.org/drawingml/2006/table">
@@ -8789,45 +8789,52 @@
                 <a:tableStyleId>{5C22544A-7EE6-4342-B048-85BDC9FD1C3A}</a:tableStyleId>
               </a:tblPr>
               <a:tblGrid>
-                <a:gridCol w="1108587">
+                <a:gridCol w="1012723">
                   <a:extLst>
                     <a:ext uri="{9D8B030D-6E8A-4147-A177-3AD203B41FA5}">
                       <a16:colId xmlns:a16="http://schemas.microsoft.com/office/drawing/2014/main" val="3255850897"/>
                     </a:ext>
                   </a:extLst>
                 </a:gridCol>
-                <a:gridCol w="1514168">
+                <a:gridCol w="1496469">
                   <a:extLst>
                     <a:ext uri="{9D8B030D-6E8A-4147-A177-3AD203B41FA5}">
                       <a16:colId xmlns:a16="http://schemas.microsoft.com/office/drawing/2014/main" val="3313193608"/>
                     </a:ext>
                   </a:extLst>
                 </a:gridCol>
-                <a:gridCol w="4345858">
+                <a:gridCol w="3856817">
                   <a:extLst>
                     <a:ext uri="{9D8B030D-6E8A-4147-A177-3AD203B41FA5}">
                       <a16:colId xmlns:a16="http://schemas.microsoft.com/office/drawing/2014/main" val="3428908328"/>
                     </a:ext>
                   </a:extLst>
                 </a:gridCol>
-                <a:gridCol w="2556387">
+                <a:gridCol w="1827703">
                   <a:extLst>
                     <a:ext uri="{9D8B030D-6E8A-4147-A177-3AD203B41FA5}">
                       <a16:colId xmlns:a16="http://schemas.microsoft.com/office/drawing/2014/main" val="89417524"/>
                     </a:ext>
                   </a:extLst>
                 </a:gridCol>
-                <a:gridCol w="1101213">
+                <a:gridCol w="1417320">
                   <a:extLst>
                     <a:ext uri="{9D8B030D-6E8A-4147-A177-3AD203B41FA5}">
                       <a16:colId xmlns:a16="http://schemas.microsoft.com/office/drawing/2014/main" val="1641976208"/>
                     </a:ext>
                   </a:extLst>
                 </a:gridCol>
-                <a:gridCol w="1111045">
+                <a:gridCol w="1111258">
                   <a:extLst>
                     <a:ext uri="{9D8B030D-6E8A-4147-A177-3AD203B41FA5}">
                       <a16:colId xmlns:a16="http://schemas.microsoft.com/office/drawing/2014/main" val="913688913"/>
+                    </a:ext>
+                  </a:extLst>
+                </a:gridCol>
+                <a:gridCol w="1014968">
+                  <a:extLst>
+                    <a:ext uri="{9D8B030D-6E8A-4147-A177-3AD203B41FA5}">
+                      <a16:colId xmlns:a16="http://schemas.microsoft.com/office/drawing/2014/main" val="4288468300"/>
                     </a:ext>
                   </a:extLst>
                 </a:gridCol>
@@ -9130,6 +9137,63 @@
                           </a:solidFill>
                         </a:rPr>
                         <a:t>Dataset </a:t>
+                      </a:r>
+                    </a:p>
+                  </a:txBody>
+                  <a:tcPr>
+                    <a:lnL w="12700" cap="flat" cmpd="sng" algn="ctr">
+                      <a:solidFill>
+                        <a:schemeClr val="tx1"/>
+                      </a:solidFill>
+                      <a:prstDash val="solid"/>
+                      <a:round/>
+                      <a:headEnd type="none" w="med" len="med"/>
+                      <a:tailEnd type="none" w="med" len="med"/>
+                    </a:lnL>
+                    <a:lnR w="12700" cap="flat" cmpd="sng" algn="ctr">
+                      <a:solidFill>
+                        <a:schemeClr val="tx1"/>
+                      </a:solidFill>
+                      <a:prstDash val="solid"/>
+                      <a:round/>
+                      <a:headEnd type="none" w="med" len="med"/>
+                      <a:tailEnd type="none" w="med" len="med"/>
+                    </a:lnR>
+                    <a:lnT w="12700" cap="flat" cmpd="sng" algn="ctr">
+                      <a:solidFill>
+                        <a:schemeClr val="tx1"/>
+                      </a:solidFill>
+                      <a:prstDash val="solid"/>
+                      <a:round/>
+                      <a:headEnd type="none" w="med" len="med"/>
+                      <a:tailEnd type="none" w="med" len="med"/>
+                    </a:lnT>
+                    <a:lnB w="12700" cap="flat" cmpd="sng" algn="ctr">
+                      <a:solidFill>
+                        <a:schemeClr val="tx1"/>
+                      </a:solidFill>
+                      <a:prstDash val="solid"/>
+                      <a:round/>
+                      <a:headEnd type="none" w="med" len="med"/>
+                      <a:tailEnd type="none" w="med" len="med"/>
+                    </a:lnB>
+                    <a:solidFill>
+                      <a:schemeClr val="bg1"/>
+                    </a:solidFill>
+                  </a:tcPr>
+                </a:tc>
+                <a:tc>
+                  <a:txBody>
+                    <a:bodyPr/>
+                    <a:lstStyle/>
+                    <a:p>
+                      <a:r>
+                        <a:rPr lang="en-GB" dirty="0">
+                          <a:solidFill>
+                            <a:sysClr val="windowText" lastClr="000000"/>
+                          </a:solidFill>
+                        </a:rPr>
+                        <a:t>Is the model happy?</a:t>
                       </a:r>
                     </a:p>
                   </a:txBody>
@@ -9418,7 +9482,7 @@
                     </a:solidFill>
                   </a:tcPr>
                 </a:tc>
-                <a:tc rowSpan="10">
+                <a:tc rowSpan="12">
                   <a:txBody>
                     <a:bodyPr/>
                     <a:lstStyle/>
@@ -9537,14 +9601,71 @@
                     </a:solidFill>
                   </a:tcPr>
                 </a:tc>
+                <a:tc>
+                  <a:txBody>
+                    <a:bodyPr/>
+                    <a:lstStyle/>
+                    <a:p>
+                      <a:r>
+                        <a:rPr lang="en-GB" sz="1400" dirty="0">
+                          <a:solidFill>
+                            <a:sysClr val="windowText" lastClr="000000"/>
+                          </a:solidFill>
+                        </a:rPr>
+                        <a:t>Y</a:t>
+                      </a:r>
+                    </a:p>
+                  </a:txBody>
+                  <a:tcPr>
+                    <a:lnL w="12700" cap="flat" cmpd="sng" algn="ctr">
+                      <a:solidFill>
+                        <a:schemeClr val="tx1"/>
+                      </a:solidFill>
+                      <a:prstDash val="solid"/>
+                      <a:round/>
+                      <a:headEnd type="none" w="med" len="med"/>
+                      <a:tailEnd type="none" w="med" len="med"/>
+                    </a:lnL>
+                    <a:lnR w="12700" cap="flat" cmpd="sng" algn="ctr">
+                      <a:solidFill>
+                        <a:schemeClr val="tx1"/>
+                      </a:solidFill>
+                      <a:prstDash val="solid"/>
+                      <a:round/>
+                      <a:headEnd type="none" w="med" len="med"/>
+                      <a:tailEnd type="none" w="med" len="med"/>
+                    </a:lnR>
+                    <a:lnT w="12700" cap="flat" cmpd="sng" algn="ctr">
+                      <a:solidFill>
+                        <a:schemeClr val="tx1"/>
+                      </a:solidFill>
+                      <a:prstDash val="solid"/>
+                      <a:round/>
+                      <a:headEnd type="none" w="med" len="med"/>
+                      <a:tailEnd type="none" w="med" len="med"/>
+                    </a:lnT>
+                    <a:lnB w="12700" cap="flat" cmpd="sng" algn="ctr">
+                      <a:solidFill>
+                        <a:schemeClr val="tx1"/>
+                      </a:solidFill>
+                      <a:prstDash val="solid"/>
+                      <a:round/>
+                      <a:headEnd type="none" w="med" len="med"/>
+                      <a:tailEnd type="none" w="med" len="med"/>
+                    </a:lnB>
+                    <a:solidFill>
+                      <a:schemeClr val="bg1"/>
+                    </a:solidFill>
+                  </a:tcPr>
+                </a:tc>
                 <a:extLst>
                   <a:ext uri="{0D108BD9-81ED-4DB2-BD59-A6C34878D82A}">
                     <a16:rowId xmlns:a16="http://schemas.microsoft.com/office/drawing/2014/main" val="3931274814"/>
                   </a:ext>
                 </a:extLst>
               </a:tr>
-              <a:tr h="586928">
-                <a:tc>
+              <a:tr h="567000">
+                <a:tc rowSpan="2">
                   <a:txBody>
                     <a:bodyPr/>
                     <a:lstStyle/>
@@ -9601,7 +9722,7 @@
                     </a:solidFill>
                   </a:tcPr>
                 </a:tc>
-                <a:tc rowSpan="9">
+                <a:tc rowSpan="11">
                   <a:txBody>
                     <a:bodyPr/>
                     <a:lstStyle/>
@@ -9658,7 +9779,7 @@
                     </a:solidFill>
                   </a:tcPr>
                 </a:tc>
-                <a:tc>
+                <a:tc rowSpan="2">
                   <a:txBody>
                     <a:bodyPr/>
                     <a:lstStyle/>
@@ -9715,7 +9836,7 @@
                     </a:solidFill>
                   </a:tcPr>
                 </a:tc>
-                <a:tc>
+                <a:tc rowSpan="2">
                   <a:txBody>
                     <a:bodyPr/>
                     <a:lstStyle/>
@@ -9826,7 +9947,7 @@
                     </a:solidFill>
                   </a:tcPr>
                 </a:tc>
-                <a:tc rowSpan="9">
+                <a:tc rowSpan="11">
                   <a:txBody>
                     <a:bodyPr/>
                     <a:lstStyle/>
@@ -9888,9 +10009,190 @@
                     </a:solidFill>
                   </a:tcPr>
                 </a:tc>
+                <a:tc>
+                  <a:txBody>
+                    <a:bodyPr/>
+                    <a:lstStyle/>
+                    <a:p>
+                      <a:r>
+                        <a:rPr lang="en-GB" sz="1400" dirty="0">
+                          <a:solidFill>
+                            <a:sysClr val="windowText" lastClr="000000"/>
+                          </a:solidFill>
+                        </a:rPr>
+                        <a:t>N</a:t>
+                      </a:r>
+                    </a:p>
+                  </a:txBody>
+                  <a:tcPr>
+                    <a:lnL w="12700" cap="flat" cmpd="sng" algn="ctr">
+                      <a:solidFill>
+                        <a:schemeClr val="tx1"/>
+                      </a:solidFill>
+                      <a:prstDash val="solid"/>
+                      <a:round/>
+                      <a:headEnd type="none" w="med" len="med"/>
+                      <a:tailEnd type="none" w="med" len="med"/>
+                    </a:lnL>
+                    <a:lnR w="12700" cap="flat" cmpd="sng" algn="ctr">
+                      <a:solidFill>
+                        <a:schemeClr val="tx1"/>
+                      </a:solidFill>
+                      <a:prstDash val="solid"/>
+                      <a:round/>
+                      <a:headEnd type="none" w="med" len="med"/>
+                      <a:tailEnd type="none" w="med" len="med"/>
+                    </a:lnR>
+                    <a:lnT w="12700" cap="flat" cmpd="sng" algn="ctr">
+                      <a:solidFill>
+                        <a:schemeClr val="tx1"/>
+                      </a:solidFill>
+                      <a:prstDash val="solid"/>
+                      <a:round/>
+                      <a:headEnd type="none" w="med" len="med"/>
+                      <a:tailEnd type="none" w="med" len="med"/>
+                    </a:lnT>
+                    <a:lnB w="12700" cap="flat" cmpd="sng" algn="ctr">
+                      <a:solidFill>
+                        <a:schemeClr val="tx1"/>
+                      </a:solidFill>
+                      <a:prstDash val="solid"/>
+                      <a:round/>
+                      <a:headEnd type="none" w="med" len="med"/>
+                      <a:tailEnd type="none" w="med" len="med"/>
+                    </a:lnB>
+                    <a:solidFill>
+                      <a:schemeClr val="bg1"/>
+                    </a:solidFill>
+                  </a:tcPr>
+                </a:tc>
                 <a:extLst>
                   <a:ext uri="{0D108BD9-81ED-4DB2-BD59-A6C34878D82A}">
                     <a16:rowId xmlns:a16="http://schemas.microsoft.com/office/drawing/2014/main" val="2514973877"/>
+                  </a:ext>
+                </a:extLst>
+              </a:tr>
+              <a:tr h="0">
+                <a:tc vMerge="1">
+                  <a:txBody>
+                    <a:bodyPr/>
+                    <a:lstStyle/>
+                    <a:p>
+                      <a:endParaRPr lang="en-GB"/>
+                    </a:p>
+                  </a:txBody>
+                  <a:tcPr/>
+                </a:tc>
+                <a:tc vMerge="1">
+                  <a:txBody>
+                    <a:bodyPr/>
+                    <a:lstStyle/>
+                    <a:p>
+                      <a:endParaRPr lang="en-GB"/>
+                    </a:p>
+                  </a:txBody>
+                  <a:tcPr/>
+                </a:tc>
+                <a:tc vMerge="1">
+                  <a:txBody>
+                    <a:bodyPr/>
+                    <a:lstStyle/>
+                    <a:p>
+                      <a:endParaRPr lang="en-GB"/>
+                    </a:p>
+                  </a:txBody>
+                  <a:tcPr/>
+                </a:tc>
+                <a:tc vMerge="1">
+                  <a:txBody>
+                    <a:bodyPr/>
+                    <a:lstStyle/>
+                    <a:p>
+                      <a:endParaRPr lang="en-GB"/>
+                    </a:p>
+                  </a:txBody>
+                  <a:tcPr/>
+                </a:tc>
+                <a:tc vMerge="1">
+                  <a:txBody>
+                    <a:bodyPr/>
+                    <a:lstStyle/>
+                    <a:p>
+                      <a:endParaRPr lang="en-GB"/>
+                    </a:p>
+                  </a:txBody>
+                  <a:tcPr/>
+                </a:tc>
+                <a:tc vMerge="1">
+                  <a:txBody>
+                    <a:bodyPr/>
+                    <a:lstStyle/>
+                    <a:p>
+                      <a:endParaRPr lang="en-GB"/>
+                    </a:p>
+                  </a:txBody>
+                  <a:tcPr/>
+                </a:tc>
+                <a:tc rowSpan="3">
+                  <a:txBody>
+                    <a:bodyPr/>
+                    <a:lstStyle/>
+                    <a:p>
+                      <a:r>
+                        <a:rPr lang="en-GB" sz="1400" dirty="0">
+                          <a:solidFill>
+                            <a:sysClr val="windowText" lastClr="000000"/>
+                          </a:solidFill>
+                        </a:rPr>
+                        <a:t>Y</a:t>
+                      </a:r>
+                    </a:p>
+                  </a:txBody>
+                  <a:tcPr>
+                    <a:lnL w="12700" cap="flat" cmpd="sng" algn="ctr">
+                      <a:solidFill>
+                        <a:schemeClr val="tx1"/>
+                      </a:solidFill>
+                      <a:prstDash val="solid"/>
+                      <a:round/>
+                      <a:headEnd type="none" w="med" len="med"/>
+                      <a:tailEnd type="none" w="med" len="med"/>
+                    </a:lnL>
+                    <a:lnR w="12700" cap="flat" cmpd="sng" algn="ctr">
+                      <a:solidFill>
+                        <a:schemeClr val="tx1"/>
+                      </a:solidFill>
+                      <a:prstDash val="solid"/>
+                      <a:round/>
+                      <a:headEnd type="none" w="med" len="med"/>
+                      <a:tailEnd type="none" w="med" len="med"/>
+                    </a:lnR>
+                    <a:lnT w="12700" cap="flat" cmpd="sng" algn="ctr">
+                      <a:solidFill>
+                        <a:schemeClr val="tx1"/>
+                      </a:solidFill>
+                      <a:prstDash val="solid"/>
+                      <a:round/>
+                      <a:headEnd type="none" w="med" len="med"/>
+                      <a:tailEnd type="none" w="med" len="med"/>
+                    </a:lnT>
+                    <a:lnB w="12700" cap="flat" cmpd="sng" algn="ctr">
+                      <a:solidFill>
+                        <a:schemeClr val="tx1"/>
+                      </a:solidFill>
+                      <a:prstDash val="solid"/>
+                      <a:round/>
+                      <a:headEnd type="none" w="med" len="med"/>
+                      <a:tailEnd type="none" w="med" len="med"/>
+                    </a:lnB>
+                    <a:solidFill>
+                      <a:schemeClr val="bg1"/>
+                    </a:solidFill>
+                  </a:tcPr>
+                </a:tc>
+                <a:extLst>
+                  <a:ext uri="{0D108BD9-81ED-4DB2-BD59-A6C34878D82A}">
+                    <a16:rowId xmlns:a16="http://schemas.microsoft.com/office/drawing/2014/main" val="3805791330"/>
                   </a:ext>
                 </a:extLst>
               </a:tr>
@@ -9929,15 +10231,6 @@
                       <a:headEnd type="none" w="med" len="med"/>
                       <a:tailEnd type="none" w="med" len="med"/>
                     </a:lnR>
-                    <a:lnT w="12700" cap="flat" cmpd="sng" algn="ctr">
-                      <a:solidFill>
-                        <a:schemeClr val="tx1"/>
-                      </a:solidFill>
-                      <a:prstDash val="solid"/>
-                      <a:round/>
-                      <a:headEnd type="none" w="med" len="med"/>
-                      <a:tailEnd type="none" w="med" len="med"/>
-                    </a:lnT>
                     <a:lnB w="12700" cap="flat" cmpd="sng" algn="ctr">
                       <a:solidFill>
                         <a:schemeClr val="tx1"/>
@@ -9983,15 +10276,6 @@
                       <a:headEnd type="none" w="med" len="med"/>
                       <a:tailEnd type="none" w="med" len="med"/>
                     </a:lnR>
-                    <a:lnT w="12700" cap="flat" cmpd="sng" algn="ctr">
-                      <a:solidFill>
-                        <a:schemeClr val="tx1"/>
-                      </a:solidFill>
-                      <a:prstDash val="solid"/>
-                      <a:round/>
-                      <a:headEnd type="none" w="med" len="med"/>
-                      <a:tailEnd type="none" w="med" len="med"/>
-                    </a:lnT>
                     <a:lnB w="12700" cap="flat" cmpd="sng" algn="ctr">
                       <a:solidFill>
                         <a:schemeClr val="tx1"/>
@@ -10080,7 +10364,7 @@
                     </a:solidFill>
                   </a:tcPr>
                 </a:tc>
-                <a:tc rowSpan="8">
+                <a:tc rowSpan="9">
                   <a:txBody>
                     <a:bodyPr/>
                     <a:lstStyle/>
@@ -10093,6 +10377,8 @@
                         </a:rPr>
                         <a:t>Season*</a:t>
                       </a:r>
+                    </a:p>
+                    <a:p>
                       <a:r>
                         <a:rPr lang="en-GB" sz="1400" dirty="0" err="1">
                           <a:solidFill>
@@ -10181,15 +10467,6 @@
                       <a:headEnd type="none" w="med" len="med"/>
                       <a:tailEnd type="none" w="med" len="med"/>
                     </a:lnR>
-                    <a:lnT w="12700" cap="flat" cmpd="sng" algn="ctr">
-                      <a:solidFill>
-                        <a:schemeClr val="tx1"/>
-                      </a:solidFill>
-                      <a:prstDash val="solid"/>
-                      <a:round/>
-                      <a:headEnd type="none" w="med" len="med"/>
-                      <a:tailEnd type="none" w="med" len="med"/>
-                    </a:lnT>
                     <a:lnB w="12700" cap="flat" cmpd="sng" algn="ctr">
                       <a:solidFill>
                         <a:schemeClr val="tx1"/>
@@ -10235,79 +10512,6 @@
                       <a:headEnd type="none" w="med" len="med"/>
                       <a:tailEnd type="none" w="med" len="med"/>
                     </a:lnR>
-                    <a:lnT w="12700" cap="flat" cmpd="sng" algn="ctr">
-                      <a:solidFill>
-                        <a:schemeClr val="tx1"/>
-                      </a:solidFill>
-                      <a:prstDash val="solid"/>
-                      <a:round/>
-                      <a:headEnd type="none" w="med" len="med"/>
-                      <a:tailEnd type="none" w="med" len="med"/>
-                    </a:lnT>
-                    <a:lnB w="12700" cap="flat" cmpd="sng" algn="ctr">
-                      <a:solidFill>
-                        <a:schemeClr val="tx1"/>
-                      </a:solidFill>
-                      <a:prstDash val="solid"/>
-                      <a:round/>
-                      <a:headEnd type="none" w="med" len="med"/>
-                      <a:tailEnd type="none" w="med" len="med"/>
-                    </a:lnB>
-                    <a:solidFill>
-                      <a:schemeClr val="bg1"/>
-                    </a:solidFill>
-                  </a:tcPr>
-                </a:tc>
-                <a:extLst>
-                  <a:ext uri="{0D108BD9-81ED-4DB2-BD59-A6C34878D82A}">
-                    <a16:rowId xmlns:a16="http://schemas.microsoft.com/office/drawing/2014/main" val="784936357"/>
-                  </a:ext>
-                </a:extLst>
-              </a:tr>
-              <a:tr h="420056">
-                <a:tc>
-                  <a:txBody>
-                    <a:bodyPr/>
-                    <a:lstStyle/>
-                    <a:p>
-                      <a:r>
-                        <a:rPr lang="en-GB" sz="1400" dirty="0">
-                          <a:solidFill>
-                            <a:sysClr val="windowText" lastClr="000000"/>
-                          </a:solidFill>
-                        </a:rPr>
-                        <a:t>4</a:t>
-                      </a:r>
-                    </a:p>
-                  </a:txBody>
-                  <a:tcPr>
-                    <a:lnL w="12700" cap="flat" cmpd="sng" algn="ctr">
-                      <a:solidFill>
-                        <a:schemeClr val="tx1"/>
-                      </a:solidFill>
-                      <a:prstDash val="solid"/>
-                      <a:round/>
-                      <a:headEnd type="none" w="med" len="med"/>
-                      <a:tailEnd type="none" w="med" len="med"/>
-                    </a:lnL>
-                    <a:lnR w="12700" cap="flat" cmpd="sng" algn="ctr">
-                      <a:solidFill>
-                        <a:schemeClr val="tx1"/>
-                      </a:solidFill>
-                      <a:prstDash val="solid"/>
-                      <a:round/>
-                      <a:headEnd type="none" w="med" len="med"/>
-                      <a:tailEnd type="none" w="med" len="med"/>
-                    </a:lnR>
-                    <a:lnT w="12700" cap="flat" cmpd="sng" algn="ctr">
-                      <a:solidFill>
-                        <a:schemeClr val="tx1"/>
-                      </a:solidFill>
-                      <a:prstDash val="solid"/>
-                      <a:round/>
-                      <a:headEnd type="none" w="med" len="med"/>
-                      <a:tailEnd type="none" w="med" len="med"/>
-                    </a:lnT>
                     <a:lnB w="12700" cap="flat" cmpd="sng" algn="ctr">
                       <a:solidFill>
                         <a:schemeClr val="tx1"/>
@@ -10327,11 +10531,31 @@
                     <a:bodyPr/>
                     <a:lstStyle/>
                     <a:p>
-                      <a:endParaRPr lang="en-GB" sz="1400" dirty="0">
-                        <a:solidFill>
-                          <a:sysClr val="windowText" lastClr="000000"/>
-                        </a:solidFill>
-                      </a:endParaRPr>
+                      <a:endParaRPr lang="en-GB" dirty="0"/>
+                    </a:p>
+                  </a:txBody>
+                  <a:tcPr/>
+                </a:tc>
+                <a:extLst>
+                  <a:ext uri="{0D108BD9-81ED-4DB2-BD59-A6C34878D82A}">
+                    <a16:rowId xmlns:a16="http://schemas.microsoft.com/office/drawing/2014/main" val="784936357"/>
+                  </a:ext>
+                </a:extLst>
+              </a:tr>
+              <a:tr h="0">
+                <a:tc rowSpan="2">
+                  <a:txBody>
+                    <a:bodyPr/>
+                    <a:lstStyle/>
+                    <a:p>
+                      <a:r>
+                        <a:rPr lang="en-GB" sz="1400" dirty="0">
+                          <a:solidFill>
+                            <a:sysClr val="windowText" lastClr="000000"/>
+                          </a:solidFill>
+                        </a:rPr>
+                        <a:t>4</a:t>
+                      </a:r>
                     </a:p>
                   </a:txBody>
                   <a:tcPr>
@@ -10376,7 +10600,61 @@
                     </a:solidFill>
                   </a:tcPr>
                 </a:tc>
-                <a:tc>
+                <a:tc vMerge="1">
+                  <a:txBody>
+                    <a:bodyPr/>
+                    <a:lstStyle/>
+                    <a:p>
+                      <a:endParaRPr lang="en-GB" sz="1400" dirty="0">
+                        <a:solidFill>
+                          <a:sysClr val="windowText" lastClr="000000"/>
+                        </a:solidFill>
+                      </a:endParaRPr>
+                    </a:p>
+                  </a:txBody>
+                  <a:tcPr>
+                    <a:lnL w="12700" cap="flat" cmpd="sng" algn="ctr">
+                      <a:solidFill>
+                        <a:schemeClr val="tx1"/>
+                      </a:solidFill>
+                      <a:prstDash val="solid"/>
+                      <a:round/>
+                      <a:headEnd type="none" w="med" len="med"/>
+                      <a:tailEnd type="none" w="med" len="med"/>
+                    </a:lnL>
+                    <a:lnR w="12700" cap="flat" cmpd="sng" algn="ctr">
+                      <a:solidFill>
+                        <a:schemeClr val="tx1"/>
+                      </a:solidFill>
+                      <a:prstDash val="solid"/>
+                      <a:round/>
+                      <a:headEnd type="none" w="med" len="med"/>
+                      <a:tailEnd type="none" w="med" len="med"/>
+                    </a:lnR>
+                    <a:lnT w="12700" cap="flat" cmpd="sng" algn="ctr">
+                      <a:solidFill>
+                        <a:schemeClr val="tx1"/>
+                      </a:solidFill>
+                      <a:prstDash val="solid"/>
+                      <a:round/>
+                      <a:headEnd type="none" w="med" len="med"/>
+                      <a:tailEnd type="none" w="med" len="med"/>
+                    </a:lnT>
+                    <a:lnB w="12700" cap="flat" cmpd="sng" algn="ctr">
+                      <a:solidFill>
+                        <a:schemeClr val="tx1"/>
+                      </a:solidFill>
+                      <a:prstDash val="solid"/>
+                      <a:round/>
+                      <a:headEnd type="none" w="med" len="med"/>
+                      <a:tailEnd type="none" w="med" len="med"/>
+                    </a:lnB>
+                    <a:solidFill>
+                      <a:schemeClr val="bg1"/>
+                    </a:solidFill>
+                  </a:tcPr>
+                </a:tc>
+                <a:tc rowSpan="2">
                   <a:txBody>
                     <a:bodyPr/>
                     <a:lstStyle/>
@@ -10612,13 +10890,166 @@
                     </a:solidFill>
                   </a:tcPr>
                 </a:tc>
+                <a:tc vMerge="1">
+                  <a:txBody>
+                    <a:bodyPr/>
+                    <a:lstStyle/>
+                    <a:p>
+                      <a:endParaRPr lang="en-GB" dirty="0"/>
+                    </a:p>
+                  </a:txBody>
+                  <a:tcPr>
+                    <a:lnL w="12700" cap="flat" cmpd="sng" algn="ctr">
+                      <a:solidFill>
+                        <a:schemeClr val="tx1"/>
+                      </a:solidFill>
+                      <a:prstDash val="solid"/>
+                      <a:round/>
+                      <a:headEnd type="none" w="med" len="med"/>
+                      <a:tailEnd type="none" w="med" len="med"/>
+                    </a:lnL>
+                    <a:lnT w="12700" cap="flat" cmpd="sng" algn="ctr">
+                      <a:solidFill>
+                        <a:schemeClr val="tx1"/>
+                      </a:solidFill>
+                      <a:prstDash val="solid"/>
+                      <a:round/>
+                      <a:headEnd type="none" w="med" len="med"/>
+                      <a:tailEnd type="none" w="med" len="med"/>
+                    </a:lnT>
+                  </a:tcPr>
+                </a:tc>
                 <a:extLst>
                   <a:ext uri="{0D108BD9-81ED-4DB2-BD59-A6C34878D82A}">
                     <a16:rowId xmlns:a16="http://schemas.microsoft.com/office/drawing/2014/main" val="569519841"/>
                   </a:ext>
                 </a:extLst>
               </a:tr>
-              <a:tr h="420056">
+              <a:tr h="597840">
+                <a:tc vMerge="1">
+                  <a:txBody>
+                    <a:bodyPr/>
+                    <a:lstStyle/>
+                    <a:p>
+                      <a:endParaRPr lang="en-GB"/>
+                    </a:p>
+                  </a:txBody>
+                  <a:tcPr/>
+                </a:tc>
+                <a:tc vMerge="1">
+                  <a:txBody>
+                    <a:bodyPr/>
+                    <a:lstStyle/>
+                    <a:p>
+                      <a:endParaRPr lang="en-GB"/>
+                    </a:p>
+                  </a:txBody>
+                  <a:tcPr/>
+                </a:tc>
+                <a:tc vMerge="1">
+                  <a:txBody>
+                    <a:bodyPr/>
+                    <a:lstStyle/>
+                    <a:p>
+                      <a:endParaRPr lang="en-GB"/>
+                    </a:p>
+                  </a:txBody>
+                  <a:tcPr/>
+                </a:tc>
+                <a:tc vMerge="1">
+                  <a:txBody>
+                    <a:bodyPr/>
+                    <a:lstStyle/>
+                    <a:p>
+                      <a:endParaRPr lang="en-GB"/>
+                    </a:p>
+                  </a:txBody>
+                  <a:tcPr/>
+                </a:tc>
+                <a:tc vMerge="1">
+                  <a:txBody>
+                    <a:bodyPr/>
+                    <a:lstStyle/>
+                    <a:p>
+                      <a:endParaRPr lang="en-GB"/>
+                    </a:p>
+                  </a:txBody>
+                  <a:tcPr/>
+                </a:tc>
+                <a:tc vMerge="1">
+                  <a:txBody>
+                    <a:bodyPr/>
+                    <a:lstStyle/>
+                    <a:p>
+                      <a:endParaRPr lang="en-GB"/>
+                    </a:p>
+                  </a:txBody>
+                  <a:tcPr/>
+                </a:tc>
+                <a:tc>
+                  <a:txBody>
+                    <a:bodyPr/>
+                    <a:lstStyle/>
+                    <a:p>
+                      <a:r>
+                        <a:rPr lang="en-GB" sz="1400" dirty="0">
+                          <a:solidFill>
+                            <a:sysClr val="windowText" lastClr="000000"/>
+                          </a:solidFill>
+                        </a:rPr>
+                        <a:t>Y</a:t>
+                      </a:r>
+                    </a:p>
+                  </a:txBody>
+                  <a:tcPr>
+                    <a:lnL w="12700" cap="flat" cmpd="sng" algn="ctr">
+                      <a:solidFill>
+                        <a:schemeClr val="tx1"/>
+                      </a:solidFill>
+                      <a:prstDash val="solid"/>
+                      <a:round/>
+                      <a:headEnd type="none" w="med" len="med"/>
+                      <a:tailEnd type="none" w="med" len="med"/>
+                    </a:lnL>
+                    <a:lnR w="12700" cap="flat" cmpd="sng" algn="ctr">
+                      <a:solidFill>
+                        <a:schemeClr val="tx1"/>
+                      </a:solidFill>
+                      <a:prstDash val="solid"/>
+                      <a:round/>
+                      <a:headEnd type="none" w="med" len="med"/>
+                      <a:tailEnd type="none" w="med" len="med"/>
+                    </a:lnR>
+                    <a:lnT w="12700" cap="flat" cmpd="sng" algn="ctr">
+                      <a:solidFill>
+                        <a:schemeClr val="tx1"/>
+                      </a:solidFill>
+                      <a:prstDash val="solid"/>
+                      <a:round/>
+                      <a:headEnd type="none" w="med" len="med"/>
+                      <a:tailEnd type="none" w="med" len="med"/>
+                    </a:lnT>
+                    <a:lnB w="12700" cap="flat" cmpd="sng" algn="ctr">
+                      <a:solidFill>
+                        <a:schemeClr val="tx1"/>
+                      </a:solidFill>
+                      <a:prstDash val="solid"/>
+                      <a:round/>
+                      <a:headEnd type="none" w="med" len="med"/>
+                      <a:tailEnd type="none" w="med" len="med"/>
+                    </a:lnB>
+                    <a:solidFill>
+                      <a:schemeClr val="bg1"/>
+                    </a:solidFill>
+                  </a:tcPr>
+                </a:tc>
+                <a:extLst>
+                  <a:ext uri="{0D108BD9-81ED-4DB2-BD59-A6C34878D82A}">
+                    <a16:rowId xmlns:a16="http://schemas.microsoft.com/office/drawing/2014/main" val="642478894"/>
+                  </a:ext>
+                </a:extLst>
+              </a:tr>
+              <a:tr h="609960">
                 <a:tc>
                   <a:txBody>
                     <a:bodyPr/>
@@ -10966,13 +11397,66 @@
                     </a:solidFill>
                   </a:tcPr>
                 </a:tc>
+                <a:tc>
+                  <a:txBody>
+                    <a:bodyPr/>
+                    <a:lstStyle/>
+                    <a:p>
+                      <a:r>
+                        <a:rPr lang="en-GB" dirty="0"/>
+                        <a:t>Y</a:t>
+                      </a:r>
+                    </a:p>
+                  </a:txBody>
+                  <a:tcPr>
+                    <a:lnL w="12700" cap="flat" cmpd="sng" algn="ctr">
+                      <a:solidFill>
+                        <a:schemeClr val="tx1"/>
+                      </a:solidFill>
+                      <a:prstDash val="solid"/>
+                      <a:round/>
+                      <a:headEnd type="none" w="med" len="med"/>
+                      <a:tailEnd type="none" w="med" len="med"/>
+                    </a:lnL>
+                    <a:lnR w="12700" cap="flat" cmpd="sng" algn="ctr">
+                      <a:solidFill>
+                        <a:schemeClr val="tx1"/>
+                      </a:solidFill>
+                      <a:prstDash val="solid"/>
+                      <a:round/>
+                      <a:headEnd type="none" w="med" len="med"/>
+                      <a:tailEnd type="none" w="med" len="med"/>
+                    </a:lnR>
+                    <a:lnT w="12700" cap="flat" cmpd="sng" algn="ctr">
+                      <a:solidFill>
+                        <a:schemeClr val="tx1"/>
+                      </a:solidFill>
+                      <a:prstDash val="solid"/>
+                      <a:round/>
+                      <a:headEnd type="none" w="med" len="med"/>
+                      <a:tailEnd type="none" w="med" len="med"/>
+                    </a:lnT>
+                    <a:lnB w="12700" cap="flat" cmpd="sng" algn="ctr">
+                      <a:solidFill>
+                        <a:schemeClr val="tx1"/>
+                      </a:solidFill>
+                      <a:prstDash val="solid"/>
+                      <a:round/>
+                      <a:headEnd type="none" w="med" len="med"/>
+                      <a:tailEnd type="none" w="med" len="med"/>
+                    </a:lnB>
+                    <a:solidFill>
+                      <a:schemeClr val="bg1"/>
+                    </a:solidFill>
+                  </a:tcPr>
+                </a:tc>
                 <a:extLst>
                   <a:ext uri="{0D108BD9-81ED-4DB2-BD59-A6C34878D82A}">
                     <a16:rowId xmlns:a16="http://schemas.microsoft.com/office/drawing/2014/main" val="4138900199"/>
                   </a:ext>
                 </a:extLst>
               </a:tr>
-              <a:tr h="420056">
+              <a:tr h="561120">
                 <a:tc>
                   <a:txBody>
                     <a:bodyPr/>
@@ -11320,13 +11804,66 @@
                     </a:solidFill>
                   </a:tcPr>
                 </a:tc>
+                <a:tc>
+                  <a:txBody>
+                    <a:bodyPr/>
+                    <a:lstStyle/>
+                    <a:p>
+                      <a:r>
+                        <a:rPr lang="en-GB" dirty="0"/>
+                        <a:t>N</a:t>
+                      </a:r>
+                    </a:p>
+                  </a:txBody>
+                  <a:tcPr>
+                    <a:lnL w="12700" cap="flat" cmpd="sng" algn="ctr">
+                      <a:solidFill>
+                        <a:schemeClr val="tx1"/>
+                      </a:solidFill>
+                      <a:prstDash val="solid"/>
+                      <a:round/>
+                      <a:headEnd type="none" w="med" len="med"/>
+                      <a:tailEnd type="none" w="med" len="med"/>
+                    </a:lnL>
+                    <a:lnR w="12700" cap="flat" cmpd="sng" algn="ctr">
+                      <a:solidFill>
+                        <a:schemeClr val="tx1"/>
+                      </a:solidFill>
+                      <a:prstDash val="solid"/>
+                      <a:round/>
+                      <a:headEnd type="none" w="med" len="med"/>
+                      <a:tailEnd type="none" w="med" len="med"/>
+                    </a:lnR>
+                    <a:lnT w="12700" cap="flat" cmpd="sng" algn="ctr">
+                      <a:solidFill>
+                        <a:schemeClr val="tx1"/>
+                      </a:solidFill>
+                      <a:prstDash val="solid"/>
+                      <a:round/>
+                      <a:headEnd type="none" w="med" len="med"/>
+                      <a:tailEnd type="none" w="med" len="med"/>
+                    </a:lnT>
+                    <a:lnB w="12700" cap="flat" cmpd="sng" algn="ctr">
+                      <a:solidFill>
+                        <a:schemeClr val="tx1"/>
+                      </a:solidFill>
+                      <a:prstDash val="solid"/>
+                      <a:round/>
+                      <a:headEnd type="none" w="med" len="med"/>
+                      <a:tailEnd type="none" w="med" len="med"/>
+                    </a:lnB>
+                    <a:solidFill>
+                      <a:schemeClr val="bg1"/>
+                    </a:solidFill>
+                  </a:tcPr>
+                </a:tc>
                 <a:extLst>
                   <a:ext uri="{0D108BD9-81ED-4DB2-BD59-A6C34878D82A}">
                     <a16:rowId xmlns:a16="http://schemas.microsoft.com/office/drawing/2014/main" val="860495391"/>
                   </a:ext>
                 </a:extLst>
               </a:tr>
-              <a:tr h="420056">
+              <a:tr h="518160">
                 <a:tc>
                   <a:txBody>
                     <a:bodyPr/>
@@ -11674,13 +12211,66 @@
                     </a:solidFill>
                   </a:tcPr>
                 </a:tc>
+                <a:tc>
+                  <a:txBody>
+                    <a:bodyPr/>
+                    <a:lstStyle/>
+                    <a:p>
+                      <a:r>
+                        <a:rPr lang="en-GB" dirty="0"/>
+                        <a:t>N</a:t>
+                      </a:r>
+                    </a:p>
+                  </a:txBody>
+                  <a:tcPr>
+                    <a:lnL w="12700" cap="flat" cmpd="sng" algn="ctr">
+                      <a:solidFill>
+                        <a:schemeClr val="tx1"/>
+                      </a:solidFill>
+                      <a:prstDash val="solid"/>
+                      <a:round/>
+                      <a:headEnd type="none" w="med" len="med"/>
+                      <a:tailEnd type="none" w="med" len="med"/>
+                    </a:lnL>
+                    <a:lnR w="12700" cap="flat" cmpd="sng" algn="ctr">
+                      <a:solidFill>
+                        <a:schemeClr val="tx1"/>
+                      </a:solidFill>
+                      <a:prstDash val="solid"/>
+                      <a:round/>
+                      <a:headEnd type="none" w="med" len="med"/>
+                      <a:tailEnd type="none" w="med" len="med"/>
+                    </a:lnR>
+                    <a:lnT w="12700" cap="flat" cmpd="sng" algn="ctr">
+                      <a:solidFill>
+                        <a:schemeClr val="tx1"/>
+                      </a:solidFill>
+                      <a:prstDash val="solid"/>
+                      <a:round/>
+                      <a:headEnd type="none" w="med" len="med"/>
+                      <a:tailEnd type="none" w="med" len="med"/>
+                    </a:lnT>
+                    <a:lnB w="12700" cap="flat" cmpd="sng" algn="ctr">
+                      <a:solidFill>
+                        <a:schemeClr val="tx1"/>
+                      </a:solidFill>
+                      <a:prstDash val="solid"/>
+                      <a:round/>
+                      <a:headEnd type="none" w="med" len="med"/>
+                      <a:tailEnd type="none" w="med" len="med"/>
+                    </a:lnB>
+                    <a:solidFill>
+                      <a:schemeClr val="bg1"/>
+                    </a:solidFill>
+                  </a:tcPr>
+                </a:tc>
                 <a:extLst>
                   <a:ext uri="{0D108BD9-81ED-4DB2-BD59-A6C34878D82A}">
                     <a16:rowId xmlns:a16="http://schemas.microsoft.com/office/drawing/2014/main" val="189821952"/>
                   </a:ext>
                 </a:extLst>
               </a:tr>
-              <a:tr h="420056">
+              <a:tr h="518160">
                 <a:tc>
                   <a:txBody>
                     <a:bodyPr/>
@@ -12028,13 +12618,66 @@
                     </a:solidFill>
                   </a:tcPr>
                 </a:tc>
+                <a:tc>
+                  <a:txBody>
+                    <a:bodyPr/>
+                    <a:lstStyle/>
+                    <a:p>
+                      <a:r>
+                        <a:rPr lang="en-GB" dirty="0"/>
+                        <a:t>N</a:t>
+                      </a:r>
+                    </a:p>
+                  </a:txBody>
+                  <a:tcPr>
+                    <a:lnL w="12700" cap="flat" cmpd="sng" algn="ctr">
+                      <a:solidFill>
+                        <a:schemeClr val="tx1"/>
+                      </a:solidFill>
+                      <a:prstDash val="solid"/>
+                      <a:round/>
+                      <a:headEnd type="none" w="med" len="med"/>
+                      <a:tailEnd type="none" w="med" len="med"/>
+                    </a:lnL>
+                    <a:lnR w="12700" cap="flat" cmpd="sng" algn="ctr">
+                      <a:solidFill>
+                        <a:schemeClr val="tx1"/>
+                      </a:solidFill>
+                      <a:prstDash val="solid"/>
+                      <a:round/>
+                      <a:headEnd type="none" w="med" len="med"/>
+                      <a:tailEnd type="none" w="med" len="med"/>
+                    </a:lnR>
+                    <a:lnT w="12700" cap="flat" cmpd="sng" algn="ctr">
+                      <a:solidFill>
+                        <a:schemeClr val="tx1"/>
+                      </a:solidFill>
+                      <a:prstDash val="solid"/>
+                      <a:round/>
+                      <a:headEnd type="none" w="med" len="med"/>
+                      <a:tailEnd type="none" w="med" len="med"/>
+                    </a:lnT>
+                    <a:lnB w="12700" cap="flat" cmpd="sng" algn="ctr">
+                      <a:solidFill>
+                        <a:schemeClr val="tx1"/>
+                      </a:solidFill>
+                      <a:prstDash val="solid"/>
+                      <a:round/>
+                      <a:headEnd type="none" w="med" len="med"/>
+                      <a:tailEnd type="none" w="med" len="med"/>
+                    </a:lnB>
+                    <a:solidFill>
+                      <a:schemeClr val="bg1"/>
+                    </a:solidFill>
+                  </a:tcPr>
+                </a:tc>
                 <a:extLst>
                   <a:ext uri="{0D108BD9-81ED-4DB2-BD59-A6C34878D82A}">
                     <a16:rowId xmlns:a16="http://schemas.microsoft.com/office/drawing/2014/main" val="1915331666"/>
                   </a:ext>
                 </a:extLst>
               </a:tr>
-              <a:tr h="420056">
+              <a:tr h="540440">
                 <a:tc>
                   <a:txBody>
                     <a:bodyPr/>
@@ -12382,6 +13025,59 @@
                     </a:solidFill>
                   </a:tcPr>
                 </a:tc>
+                <a:tc>
+                  <a:txBody>
+                    <a:bodyPr/>
+                    <a:lstStyle/>
+                    <a:p>
+                      <a:r>
+                        <a:rPr lang="en-GB" dirty="0"/>
+                        <a:t>Y</a:t>
+                      </a:r>
+                    </a:p>
+                  </a:txBody>
+                  <a:tcPr>
+                    <a:lnL w="12700" cap="flat" cmpd="sng" algn="ctr">
+                      <a:solidFill>
+                        <a:schemeClr val="tx1"/>
+                      </a:solidFill>
+                      <a:prstDash val="solid"/>
+                      <a:round/>
+                      <a:headEnd type="none" w="med" len="med"/>
+                      <a:tailEnd type="none" w="med" len="med"/>
+                    </a:lnL>
+                    <a:lnR w="12700" cap="flat" cmpd="sng" algn="ctr">
+                      <a:solidFill>
+                        <a:schemeClr val="tx1"/>
+                      </a:solidFill>
+                      <a:prstDash val="solid"/>
+                      <a:round/>
+                      <a:headEnd type="none" w="med" len="med"/>
+                      <a:tailEnd type="none" w="med" len="med"/>
+                    </a:lnR>
+                    <a:lnT w="12700" cap="flat" cmpd="sng" algn="ctr">
+                      <a:solidFill>
+                        <a:schemeClr val="tx1"/>
+                      </a:solidFill>
+                      <a:prstDash val="solid"/>
+                      <a:round/>
+                      <a:headEnd type="none" w="med" len="med"/>
+                      <a:tailEnd type="none" w="med" len="med"/>
+                    </a:lnT>
+                    <a:lnB w="12700" cap="flat" cmpd="sng" algn="ctr">
+                      <a:solidFill>
+                        <a:schemeClr val="tx1"/>
+                      </a:solidFill>
+                      <a:prstDash val="solid"/>
+                      <a:round/>
+                      <a:headEnd type="none" w="med" len="med"/>
+                      <a:tailEnd type="none" w="med" len="med"/>
+                    </a:lnB>
+                    <a:solidFill>
+                      <a:schemeClr val="bg1"/>
+                    </a:solidFill>
+                  </a:tcPr>
+                </a:tc>
                 <a:extLst>
                   <a:ext uri="{0D108BD9-81ED-4DB2-BD59-A6C34878D82A}">
                     <a16:rowId xmlns:a16="http://schemas.microsoft.com/office/drawing/2014/main" val="3185565241"/>
@@ -12692,6 +13388,59 @@
                           <a:sysClr val="windowText" lastClr="000000"/>
                         </a:solidFill>
                       </a:endParaRPr>
+                    </a:p>
+                  </a:txBody>
+                  <a:tcPr>
+                    <a:lnL w="12700" cap="flat" cmpd="sng" algn="ctr">
+                      <a:solidFill>
+                        <a:schemeClr val="tx1"/>
+                      </a:solidFill>
+                      <a:prstDash val="solid"/>
+                      <a:round/>
+                      <a:headEnd type="none" w="med" len="med"/>
+                      <a:tailEnd type="none" w="med" len="med"/>
+                    </a:lnL>
+                    <a:lnR w="12700" cap="flat" cmpd="sng" algn="ctr">
+                      <a:solidFill>
+                        <a:schemeClr val="tx1"/>
+                      </a:solidFill>
+                      <a:prstDash val="solid"/>
+                      <a:round/>
+                      <a:headEnd type="none" w="med" len="med"/>
+                      <a:tailEnd type="none" w="med" len="med"/>
+                    </a:lnR>
+                    <a:lnT w="12700" cap="flat" cmpd="sng" algn="ctr">
+                      <a:solidFill>
+                        <a:schemeClr val="tx1"/>
+                      </a:solidFill>
+                      <a:prstDash val="solid"/>
+                      <a:round/>
+                      <a:headEnd type="none" w="med" len="med"/>
+                      <a:tailEnd type="none" w="med" len="med"/>
+                    </a:lnT>
+                    <a:lnB w="12700" cap="flat" cmpd="sng" algn="ctr">
+                      <a:solidFill>
+                        <a:schemeClr val="tx1"/>
+                      </a:solidFill>
+                      <a:prstDash val="solid"/>
+                      <a:round/>
+                      <a:headEnd type="none" w="med" len="med"/>
+                      <a:tailEnd type="none" w="med" len="med"/>
+                    </a:lnB>
+                    <a:solidFill>
+                      <a:schemeClr val="bg1"/>
+                    </a:solidFill>
+                  </a:tcPr>
+                </a:tc>
+                <a:tc>
+                  <a:txBody>
+                    <a:bodyPr/>
+                    <a:lstStyle/>
+                    <a:p>
+                      <a:r>
+                        <a:rPr lang="en-GB" dirty="0"/>
+                        <a:t>N</a:t>
+                      </a:r>
                     </a:p>
                   </a:txBody>
                   <a:tcPr>
@@ -12776,12 +13525,62 @@
           <a:chExt cx="0" cy="0"/>
         </a:xfrm>
       </p:grpSpPr>
+      <p:sp>
+        <p:nvSpPr>
+          <p:cNvPr id="2" name="Title 1">
+            <a:extLst>
+              <a:ext uri="{FF2B5EF4-FFF2-40B4-BE49-F238E27FC236}">
+                <a16:creationId xmlns:a16="http://schemas.microsoft.com/office/drawing/2014/main" id="{E4D581A7-C786-76A0-9DB5-75B958190F76}"/>
+              </a:ext>
+            </a:extLst>
+          </p:cNvPr>
+          <p:cNvSpPr>
+            <a:spLocks noGrp="1"/>
+          </p:cNvSpPr>
+          <p:nvPr>
+            <p:ph type="title"/>
+          </p:nvPr>
+        </p:nvSpPr>
+        <p:spPr/>
+        <p:txBody>
+          <a:bodyPr/>
+          <a:lstStyle/>
+          <a:p>
+            <a:endParaRPr lang="en-GB"/>
+          </a:p>
+        </p:txBody>
+      </p:sp>
+      <p:sp>
+        <p:nvSpPr>
+          <p:cNvPr id="3" name="Content Placeholder 2">
+            <a:extLst>
+              <a:ext uri="{FF2B5EF4-FFF2-40B4-BE49-F238E27FC236}">
+                <a16:creationId xmlns:a16="http://schemas.microsoft.com/office/drawing/2014/main" id="{044900B3-3D78-C427-84B2-33C8F0A4BBBF}"/>
+              </a:ext>
+            </a:extLst>
+          </p:cNvPr>
+          <p:cNvSpPr>
+            <a:spLocks noGrp="1"/>
+          </p:cNvSpPr>
+          <p:nvPr>
+            <p:ph idx="1"/>
+          </p:nvPr>
+        </p:nvSpPr>
+        <p:spPr/>
+        <p:txBody>
+          <a:bodyPr/>
+          <a:lstStyle/>
+          <a:p>
+            <a:endParaRPr lang="en-GB"/>
+          </a:p>
+        </p:txBody>
+      </p:sp>
       <p:pic>
         <p:nvPicPr>
           <p:cNvPr id="5" name="Picture 4">
             <a:extLst>
               <a:ext uri="{FF2B5EF4-FFF2-40B4-BE49-F238E27FC236}">
-                <a16:creationId xmlns:a16="http://schemas.microsoft.com/office/drawing/2014/main" id="{0F9556EA-F7C1-A2D5-BECD-171CD35742DB}"/>
+                <a16:creationId xmlns:a16="http://schemas.microsoft.com/office/drawing/2014/main" id="{5552BC1B-6511-234A-A2CD-DAB81EEC8A2E}"/>
               </a:ext>
             </a:extLst>
           </p:cNvPr>
@@ -12798,8 +13597,8 @@
         </p:blipFill>
         <p:spPr>
           <a:xfrm>
-            <a:off x="2161626" y="1009312"/>
-            <a:ext cx="7868748" cy="4839375"/>
+            <a:off x="1961573" y="1104575"/>
+            <a:ext cx="8268854" cy="4648849"/>
           </a:xfrm>
           <a:prstGeom prst="rect">
             <a:avLst/>
@@ -12809,7 +13608,7 @@
     </p:spTree>
     <p:extLst>
       <p:ext uri="{BB962C8B-B14F-4D97-AF65-F5344CB8AC3E}">
-        <p14:creationId xmlns:p14="http://schemas.microsoft.com/office/powerpoint/2010/main" val="2646001423"/>
+        <p14:creationId xmlns:p14="http://schemas.microsoft.com/office/powerpoint/2010/main" val="1830391399"/>
       </p:ext>
     </p:extLst>
   </p:cSld>
@@ -12841,7 +13640,7 @@
           <p:cNvPr id="2" name="Title 1">
             <a:extLst>
               <a:ext uri="{FF2B5EF4-FFF2-40B4-BE49-F238E27FC236}">
-                <a16:creationId xmlns:a16="http://schemas.microsoft.com/office/drawing/2014/main" id="{B026FCF9-DB7D-97A8-1EE7-0A14E3B4ADE2}"/>
+                <a16:creationId xmlns:a16="http://schemas.microsoft.com/office/drawing/2014/main" id="{479D7DB4-E7C7-4BA3-90FA-68AAF99D21E1}"/>
               </a:ext>
             </a:extLst>
           </p:cNvPr>
@@ -12866,7 +13665,7 @@
           <p:cNvPr id="3" name="Content Placeholder 2">
             <a:extLst>
               <a:ext uri="{FF2B5EF4-FFF2-40B4-BE49-F238E27FC236}">
-                <a16:creationId xmlns:a16="http://schemas.microsoft.com/office/drawing/2014/main" id="{E119E4C1-CDC1-F31C-A94B-BC76DC12456E}"/>
+                <a16:creationId xmlns:a16="http://schemas.microsoft.com/office/drawing/2014/main" id="{1D5E2F1A-592F-05EC-7C05-9C44A08677AA}"/>
               </a:ext>
             </a:extLst>
           </p:cNvPr>
@@ -12891,7 +13690,7 @@
           <p:cNvPr id="5" name="Picture 4">
             <a:extLst>
               <a:ext uri="{FF2B5EF4-FFF2-40B4-BE49-F238E27FC236}">
-                <a16:creationId xmlns:a16="http://schemas.microsoft.com/office/drawing/2014/main" id="{26E5824F-9B59-3286-D5AB-EFC3E031CADE}"/>
+                <a16:creationId xmlns:a16="http://schemas.microsoft.com/office/drawing/2014/main" id="{56064425-C870-9AC8-E25B-83EB46748A42}"/>
               </a:ext>
             </a:extLst>
           </p:cNvPr>
@@ -12919,7 +13718,7 @@
     </p:spTree>
     <p:extLst>
       <p:ext uri="{BB962C8B-B14F-4D97-AF65-F5344CB8AC3E}">
-        <p14:creationId xmlns:p14="http://schemas.microsoft.com/office/powerpoint/2010/main" val="2685773856"/>
+        <p14:creationId xmlns:p14="http://schemas.microsoft.com/office/powerpoint/2010/main" val="1140178640"/>
       </p:ext>
     </p:extLst>
   </p:cSld>
@@ -12951,7 +13750,7 @@
           <p:cNvPr id="2" name="Title 1">
             <a:extLst>
               <a:ext uri="{FF2B5EF4-FFF2-40B4-BE49-F238E27FC236}">
-                <a16:creationId xmlns:a16="http://schemas.microsoft.com/office/drawing/2014/main" id="{6FE1E9AD-2581-AA5C-A2A6-0DACE1354992}"/>
+                <a16:creationId xmlns:a16="http://schemas.microsoft.com/office/drawing/2014/main" id="{B099BFBD-D994-3AE5-29E8-0511A6008507}"/>
               </a:ext>
             </a:extLst>
           </p:cNvPr>
@@ -12976,7 +13775,7 @@
           <p:cNvPr id="3" name="Content Placeholder 2">
             <a:extLst>
               <a:ext uri="{FF2B5EF4-FFF2-40B4-BE49-F238E27FC236}">
-                <a16:creationId xmlns:a16="http://schemas.microsoft.com/office/drawing/2014/main" id="{9EAF973A-6BA6-E97A-5FF7-808BC31D16CF}"/>
+                <a16:creationId xmlns:a16="http://schemas.microsoft.com/office/drawing/2014/main" id="{3DFB4F12-1D73-5841-802B-88473807D58D}"/>
               </a:ext>
             </a:extLst>
           </p:cNvPr>
@@ -13001,7 +13800,7 @@
           <p:cNvPr id="5" name="Picture 4">
             <a:extLst>
               <a:ext uri="{FF2B5EF4-FFF2-40B4-BE49-F238E27FC236}">
-                <a16:creationId xmlns:a16="http://schemas.microsoft.com/office/drawing/2014/main" id="{A061014B-C643-E99E-71FA-E119CB269058}"/>
+                <a16:creationId xmlns:a16="http://schemas.microsoft.com/office/drawing/2014/main" id="{117C5448-B6DD-A00A-6DC1-4F75F1D78717}"/>
               </a:ext>
             </a:extLst>
           </p:cNvPr>
@@ -13018,8 +13817,8 @@
         </p:blipFill>
         <p:spPr>
           <a:xfrm>
-            <a:off x="1871073" y="18574"/>
-            <a:ext cx="8449854" cy="6820852"/>
+            <a:off x="2018731" y="47153"/>
+            <a:ext cx="8154538" cy="6763694"/>
           </a:xfrm>
           <a:prstGeom prst="rect">
             <a:avLst/>
@@ -13029,7 +13828,7 @@
     </p:spTree>
     <p:extLst>
       <p:ext uri="{BB962C8B-B14F-4D97-AF65-F5344CB8AC3E}">
-        <p14:creationId xmlns:p14="http://schemas.microsoft.com/office/powerpoint/2010/main" val="250216080"/>
+        <p14:creationId xmlns:p14="http://schemas.microsoft.com/office/powerpoint/2010/main" val="3521187976"/>
       </p:ext>
     </p:extLst>
   </p:cSld>
@@ -13061,7 +13860,7 @@
           <p:cNvPr id="2" name="Title 1">
             <a:extLst>
               <a:ext uri="{FF2B5EF4-FFF2-40B4-BE49-F238E27FC236}">
-                <a16:creationId xmlns:a16="http://schemas.microsoft.com/office/drawing/2014/main" id="{78BEE91A-E055-ACE4-9A95-3FA59C3CF00D}"/>
+                <a16:creationId xmlns:a16="http://schemas.microsoft.com/office/drawing/2014/main" id="{1C20BE6E-F260-16F2-7CE6-C7F040E30E45}"/>
               </a:ext>
             </a:extLst>
           </p:cNvPr>
@@ -13086,7 +13885,7 @@
           <p:cNvPr id="3" name="Content Placeholder 2">
             <a:extLst>
               <a:ext uri="{FF2B5EF4-FFF2-40B4-BE49-F238E27FC236}">
-                <a16:creationId xmlns:a16="http://schemas.microsoft.com/office/drawing/2014/main" id="{84F370FB-0B94-FE92-DFB4-12E7DFBE3483}"/>
+                <a16:creationId xmlns:a16="http://schemas.microsoft.com/office/drawing/2014/main" id="{E71EC73C-D7B0-1A6D-DAFC-AD31BC81F438}"/>
               </a:ext>
             </a:extLst>
           </p:cNvPr>
@@ -13111,7 +13910,7 @@
           <p:cNvPr id="5" name="Picture 4">
             <a:extLst>
               <a:ext uri="{FF2B5EF4-FFF2-40B4-BE49-F238E27FC236}">
-                <a16:creationId xmlns:a16="http://schemas.microsoft.com/office/drawing/2014/main" id="{A25F41F7-2482-D683-20F6-371ED26AF731}"/>
+                <a16:creationId xmlns:a16="http://schemas.microsoft.com/office/drawing/2014/main" id="{1E442980-AA0A-5564-4F0A-2811EFC3F599}"/>
               </a:ext>
             </a:extLst>
           </p:cNvPr>
@@ -13139,7 +13938,7 @@
     </p:spTree>
     <p:extLst>
       <p:ext uri="{BB962C8B-B14F-4D97-AF65-F5344CB8AC3E}">
-        <p14:creationId xmlns:p14="http://schemas.microsoft.com/office/powerpoint/2010/main" val="3779843330"/>
+        <p14:creationId xmlns:p14="http://schemas.microsoft.com/office/powerpoint/2010/main" val="1698530832"/>
       </p:ext>
     </p:extLst>
   </p:cSld>
@@ -13171,7 +13970,7 @@
           <p:cNvPr id="2" name="Title 1">
             <a:extLst>
               <a:ext uri="{FF2B5EF4-FFF2-40B4-BE49-F238E27FC236}">
-                <a16:creationId xmlns:a16="http://schemas.microsoft.com/office/drawing/2014/main" id="{52A2BD19-ACB0-7D79-C1A1-3FA6B6BFEB78}"/>
+                <a16:creationId xmlns:a16="http://schemas.microsoft.com/office/drawing/2014/main" id="{44827691-5F91-8194-83DA-9B91EF156D0C}"/>
               </a:ext>
             </a:extLst>
           </p:cNvPr>
@@ -13196,7 +13995,7 @@
           <p:cNvPr id="3" name="Content Placeholder 2">
             <a:extLst>
               <a:ext uri="{FF2B5EF4-FFF2-40B4-BE49-F238E27FC236}">
-                <a16:creationId xmlns:a16="http://schemas.microsoft.com/office/drawing/2014/main" id="{1370FAA2-EC6B-F3E4-5A22-224819B09B03}"/>
+                <a16:creationId xmlns:a16="http://schemas.microsoft.com/office/drawing/2014/main" id="{8D509E8D-027E-C703-67BA-30182128E950}"/>
               </a:ext>
             </a:extLst>
           </p:cNvPr>
@@ -13221,7 +14020,7 @@
           <p:cNvPr id="5" name="Picture 4">
             <a:extLst>
               <a:ext uri="{FF2B5EF4-FFF2-40B4-BE49-F238E27FC236}">
-                <a16:creationId xmlns:a16="http://schemas.microsoft.com/office/drawing/2014/main" id="{3F4C37CD-A452-3976-7483-B84FE5AA8242}"/>
+                <a16:creationId xmlns:a16="http://schemas.microsoft.com/office/drawing/2014/main" id="{889EC2E1-70A0-F6A1-0D00-A9594C1944DE}"/>
               </a:ext>
             </a:extLst>
           </p:cNvPr>
@@ -13238,8 +14037,8 @@
         </p:blipFill>
         <p:spPr>
           <a:xfrm>
-            <a:off x="1810870" y="0"/>
-            <a:ext cx="8570259" cy="6858000"/>
+            <a:off x="1855694" y="0"/>
+            <a:ext cx="8480612" cy="6858000"/>
           </a:xfrm>
           <a:prstGeom prst="rect">
             <a:avLst/>
@@ -13249,7 +14048,7 @@
     </p:spTree>
     <p:extLst>
       <p:ext uri="{BB962C8B-B14F-4D97-AF65-F5344CB8AC3E}">
-        <p14:creationId xmlns:p14="http://schemas.microsoft.com/office/powerpoint/2010/main" val="3943316445"/>
+        <p14:creationId xmlns:p14="http://schemas.microsoft.com/office/powerpoint/2010/main" val="944222725"/>
       </p:ext>
     </p:extLst>
   </p:cSld>
@@ -13281,7 +14080,7 @@
           <p:cNvPr id="2" name="Title 1">
             <a:extLst>
               <a:ext uri="{FF2B5EF4-FFF2-40B4-BE49-F238E27FC236}">
-                <a16:creationId xmlns:a16="http://schemas.microsoft.com/office/drawing/2014/main" id="{E266BB58-2503-D043-2ABC-CB00988C32CF}"/>
+                <a16:creationId xmlns:a16="http://schemas.microsoft.com/office/drawing/2014/main" id="{9EF19AF3-6502-776D-CEA9-90B68005E940}"/>
               </a:ext>
             </a:extLst>
           </p:cNvPr>
@@ -13306,7 +14105,7 @@
           <p:cNvPr id="3" name="Content Placeholder 2">
             <a:extLst>
               <a:ext uri="{FF2B5EF4-FFF2-40B4-BE49-F238E27FC236}">
-                <a16:creationId xmlns:a16="http://schemas.microsoft.com/office/drawing/2014/main" id="{0680A93D-A812-2188-15CE-CFDD5CC536F6}"/>
+                <a16:creationId xmlns:a16="http://schemas.microsoft.com/office/drawing/2014/main" id="{411A081C-D987-39BF-99C3-59A1D79D2D6A}"/>
               </a:ext>
             </a:extLst>
           </p:cNvPr>
@@ -13331,7 +14130,7 @@
           <p:cNvPr id="5" name="Picture 4">
             <a:extLst>
               <a:ext uri="{FF2B5EF4-FFF2-40B4-BE49-F238E27FC236}">
-                <a16:creationId xmlns:a16="http://schemas.microsoft.com/office/drawing/2014/main" id="{10EEF876-87A8-908D-B244-93425D0EF15A}"/>
+                <a16:creationId xmlns:a16="http://schemas.microsoft.com/office/drawing/2014/main" id="{0CC43815-EFAB-D46F-AA84-A3CFEF00F6EB}"/>
               </a:ext>
             </a:extLst>
           </p:cNvPr>
@@ -13359,7 +14158,7 @@
     </p:spTree>
     <p:extLst>
       <p:ext uri="{BB962C8B-B14F-4D97-AF65-F5344CB8AC3E}">
-        <p14:creationId xmlns:p14="http://schemas.microsoft.com/office/powerpoint/2010/main" val="4082606219"/>
+        <p14:creationId xmlns:p14="http://schemas.microsoft.com/office/powerpoint/2010/main" val="4028520633"/>
       </p:ext>
     </p:extLst>
   </p:cSld>

</xml_diff>